<commit_message>
updated date and news file
</commit_message>
<xml_diff>
--- a/news/2018-02-07.pptx
+++ b/news/2018-02-07.pptx
@@ -3030,21 +3030,7 @@
                 </a:uFill>
                 <a:latin typeface="Arial"/>
               </a:rPr>
-              <a:t>Click to edit the title text </a:t>
-            </a:r>
-            <a:r>
-              <a:rPr b="0" lang="en-GB" sz="4400" spc="-1" strike="noStrike">
-                <a:solidFill>
-                  <a:srgbClr val="000000"/>
-                </a:solidFill>
-                <a:uFill>
-                  <a:solidFill>
-                    <a:srgbClr val="ffffff"/>
-                  </a:solidFill>
-                </a:uFill>
-                <a:latin typeface="Arial"/>
-              </a:rPr>
-              <a:t>format</a:t>
+              <a:t>Click to edit the title text format</a:t>
             </a:r>
             <a:endParaRPr b="0" lang="en-GB" sz="4400" spc="-1" strike="noStrike">
               <a:solidFill>
@@ -3737,7 +3723,7 @@
         <p:spPr>
           <a:xfrm>
             <a:off x="504000" y="1404360"/>
-            <a:ext cx="9068760" cy="3165120"/>
+            <a:ext cx="9068400" cy="3164760"/>
           </a:xfrm>
           <a:prstGeom prst="rect">
             <a:avLst/>
@@ -3984,7 +3970,7 @@
         <p:spPr>
           <a:xfrm>
             <a:off x="0" y="0"/>
-            <a:ext cx="10077120" cy="1047600"/>
+            <a:ext cx="10076760" cy="1047240"/>
           </a:xfrm>
           <a:prstGeom prst="rect">
             <a:avLst/>
@@ -4003,7 +3989,7 @@
         <p:spPr>
           <a:xfrm>
             <a:off x="2448000" y="0"/>
-            <a:ext cx="7683840" cy="1061280"/>
+            <a:ext cx="7683480" cy="1060920"/>
           </a:xfrm>
           <a:prstGeom prst="rect">
             <a:avLst/>
@@ -4069,7 +4055,7 @@
         <p:spPr>
           <a:xfrm>
             <a:off x="39240" y="0"/>
-            <a:ext cx="1067040" cy="1075680"/>
+            <a:ext cx="1066680" cy="1075320"/>
           </a:xfrm>
           <a:prstGeom prst="rect">
             <a:avLst/>
@@ -4092,7 +4078,7 @@
         <p:spPr>
           <a:xfrm>
             <a:off x="3718440" y="4659840"/>
-            <a:ext cx="2640240" cy="2661120"/>
+            <a:ext cx="2639880" cy="2660760"/>
           </a:xfrm>
           <a:prstGeom prst="rect">
             <a:avLst/>
@@ -4160,7 +4146,7 @@
         <p:spPr>
           <a:xfrm>
             <a:off x="504000" y="1467720"/>
-            <a:ext cx="9068400" cy="1258920"/>
+            <a:ext cx="9068040" cy="1258560"/>
           </a:xfrm>
           <a:prstGeom prst="rect">
             <a:avLst/>
@@ -4255,7 +4241,7 @@
         <p:spPr>
           <a:xfrm>
             <a:off x="504000" y="2728440"/>
-            <a:ext cx="9068400" cy="4381200"/>
+            <a:ext cx="9068040" cy="4380840"/>
           </a:xfrm>
           <a:prstGeom prst="rect">
             <a:avLst/>
@@ -4274,7 +4260,7 @@
         <p:txBody>
           <a:bodyPr lIns="0" rIns="0" tIns="0" bIns="0"/>
           <a:p>
-            <a:pPr marL="432000" indent="-320760">
+            <a:pPr marL="432000" indent="-320400">
               <a:lnSpc>
                 <a:spcPct val="100000"/>
               </a:lnSpc>
@@ -4313,7 +4299,7 @@
             </a:endParaRPr>
           </a:p>
           <a:p>
-            <a:pPr marL="432000" indent="-320760">
+            <a:pPr marL="432000" indent="-320400">
               <a:lnSpc>
                 <a:spcPct val="100000"/>
               </a:lnSpc>
@@ -4352,7 +4338,7 @@
             </a:endParaRPr>
           </a:p>
           <a:p>
-            <a:pPr marL="432000" indent="-320760">
+            <a:pPr marL="432000" indent="-320400">
               <a:lnSpc>
                 <a:spcPct val="100000"/>
               </a:lnSpc>
@@ -4405,7 +4391,7 @@
         <p:spPr>
           <a:xfrm>
             <a:off x="0" y="0"/>
-            <a:ext cx="10076760" cy="1047240"/>
+            <a:ext cx="10076400" cy="1046880"/>
           </a:xfrm>
           <a:prstGeom prst="rect">
             <a:avLst/>
@@ -4428,7 +4414,7 @@
         <p:spPr>
           <a:xfrm>
             <a:off x="39240" y="0"/>
-            <a:ext cx="1066680" cy="1075320"/>
+            <a:ext cx="1066320" cy="1074960"/>
           </a:xfrm>
           <a:prstGeom prst="rect">
             <a:avLst/>
@@ -4447,7 +4433,7 @@
         <p:spPr>
           <a:xfrm>
             <a:off x="2448000" y="0"/>
-            <a:ext cx="7683840" cy="1061280"/>
+            <a:ext cx="7683480" cy="1060920"/>
           </a:xfrm>
           <a:prstGeom prst="rect">
             <a:avLst/>
@@ -4505,160 +4491,10 @@
   <p:timing>
     <p:tnLst>
       <p:par>
-        <p:cTn id="179" dur="indefinite" restart="never" nodeType="tmRoot">
+        <p:cTn id="19" dur="indefinite" restart="never" nodeType="tmRoot">
           <p:childTnLst>
             <p:seq>
-              <p:cTn id="180" nodeType="mainSeq">
-                <p:childTnLst>
-                  <p:par>
-                    <p:cTn id="181" fill="freeze">
-                      <p:stCondLst>
-                        <p:cond delay="indefinite"/>
-                      </p:stCondLst>
-                      <p:childTnLst>
-                        <p:par>
-                          <p:cTn id="182" fill="freeze">
-                            <p:stCondLst>
-                              <p:cond delay="0"/>
-                            </p:stCondLst>
-                            <p:childTnLst>
-                              <p:par>
-                                <p:cTn id="183" nodeType="clickEffect" fill="hold" presetClass="entr" presetID="1">
-                                  <p:stCondLst>
-                                    <p:cond delay="0"/>
-                                  </p:stCondLst>
-                                  <p:childTnLst>
-                                    <p:set>
-                                      <p:cBhvr>
-                                        <p:cTn id="184" dur="1" fill="hold">
-                                          <p:stCondLst>
-                                            <p:cond delay="0"/>
-                                          </p:stCondLst>
-                                        </p:cTn>
-                                        <p:tgtEl>
-                                          <p:spTgt spid="118">
-                                            <p:txEl>
-                                              <p:pRg st="0" end="28"/>
-                                            </p:txEl>
-                                          </p:spTgt>
-                                        </p:tgtEl>
-                                        <p:attrNameLst>
-                                          <p:attrName>style.visibility</p:attrName>
-                                        </p:attrNameLst>
-                                      </p:cBhvr>
-                                      <p:to>
-                                        <p:strVal val="visible"/>
-                                      </p:to>
-                                    </p:set>
-                                  </p:childTnLst>
-                                </p:cTn>
-                              </p:par>
-                            </p:childTnLst>
-                          </p:cTn>
-                        </p:par>
-                      </p:childTnLst>
-                    </p:cTn>
-                  </p:par>
-                  <p:par>
-                    <p:cTn id="185" fill="freeze">
-                      <p:stCondLst>
-                        <p:cond delay="indefinite"/>
-                      </p:stCondLst>
-                      <p:childTnLst>
-                        <p:par>
-                          <p:cTn id="186" fill="freeze">
-                            <p:stCondLst>
-                              <p:cond delay="0"/>
-                            </p:stCondLst>
-                            <p:childTnLst>
-                              <p:par>
-                                <p:cTn id="187" nodeType="clickEffect" fill="hold" presetClass="entr" presetID="1">
-                                  <p:stCondLst>
-                                    <p:cond delay="0"/>
-                                  </p:stCondLst>
-                                  <p:childTnLst>
-                                    <p:set>
-                                      <p:cBhvr>
-                                        <p:cTn id="188" dur="1" fill="hold">
-                                          <p:stCondLst>
-                                            <p:cond delay="0"/>
-                                          </p:stCondLst>
-                                        </p:cTn>
-                                        <p:tgtEl>
-                                          <p:spTgt spid="118">
-                                            <p:txEl>
-                                              <p:pRg st="28" end="55"/>
-                                            </p:txEl>
-                                          </p:spTgt>
-                                        </p:tgtEl>
-                                        <p:attrNameLst>
-                                          <p:attrName>style.visibility</p:attrName>
-                                        </p:attrNameLst>
-                                      </p:cBhvr>
-                                      <p:to>
-                                        <p:strVal val="visible"/>
-                                      </p:to>
-                                    </p:set>
-                                  </p:childTnLst>
-                                </p:cTn>
-                              </p:par>
-                            </p:childTnLst>
-                          </p:cTn>
-                        </p:par>
-                      </p:childTnLst>
-                    </p:cTn>
-                  </p:par>
-                  <p:par>
-                    <p:cTn id="189" fill="freeze">
-                      <p:stCondLst>
-                        <p:cond delay="indefinite"/>
-                      </p:stCondLst>
-                      <p:childTnLst>
-                        <p:par>
-                          <p:cTn id="190" fill="freeze">
-                            <p:stCondLst>
-                              <p:cond delay="0"/>
-                            </p:stCondLst>
-                            <p:childTnLst>
-                              <p:par>
-                                <p:cTn id="191" nodeType="clickEffect" fill="hold" presetClass="entr" presetID="1">
-                                  <p:stCondLst>
-                                    <p:cond delay="0"/>
-                                  </p:stCondLst>
-                                  <p:childTnLst>
-                                    <p:set>
-                                      <p:cBhvr>
-                                        <p:cTn id="192" dur="1" fill="hold">
-                                          <p:stCondLst>
-                                            <p:cond delay="0"/>
-                                          </p:stCondLst>
-                                        </p:cTn>
-                                        <p:tgtEl>
-                                          <p:spTgt spid="118">
-                                            <p:txEl>
-                                              <p:pRg st="55" end="70"/>
-                                            </p:txEl>
-                                          </p:spTgt>
-                                        </p:tgtEl>
-                                        <p:attrNameLst>
-                                          <p:attrName>style.visibility</p:attrName>
-                                        </p:attrNameLst>
-                                      </p:cBhvr>
-                                      <p:to>
-                                        <p:strVal val="visible"/>
-                                      </p:to>
-                                    </p:set>
-                                  </p:childTnLst>
-                                </p:cTn>
-                              </p:par>
-                            </p:childTnLst>
-                          </p:cTn>
-                        </p:par>
-                      </p:childTnLst>
-                    </p:cTn>
-                  </p:par>
-                </p:childTnLst>
-              </p:cTn>
+              <p:cTn id="20" nodeType="mainSeq"/>
               <p:prevCondLst>
                 <p:cond delay="0" evt="onPrev">
                   <p:tgtEl>
@@ -4708,7 +4544,7 @@
         <p:spPr>
           <a:xfrm>
             <a:off x="504000" y="1467720"/>
-            <a:ext cx="9068400" cy="1258920"/>
+            <a:ext cx="9068040" cy="1258560"/>
           </a:xfrm>
           <a:prstGeom prst="rect">
             <a:avLst/>
@@ -4770,7 +4606,7 @@
         <p:spPr>
           <a:xfrm>
             <a:off x="504000" y="2728440"/>
-            <a:ext cx="9068400" cy="4381200"/>
+            <a:ext cx="9068040" cy="4380840"/>
           </a:xfrm>
           <a:prstGeom prst="rect">
             <a:avLst/>
@@ -4800,7 +4636,7 @@
         <p:spPr>
           <a:xfrm>
             <a:off x="0" y="0"/>
-            <a:ext cx="10076760" cy="1047240"/>
+            <a:ext cx="10076400" cy="1046880"/>
           </a:xfrm>
           <a:prstGeom prst="rect">
             <a:avLst/>
@@ -4823,7 +4659,7 @@
         <p:spPr>
           <a:xfrm>
             <a:off x="39240" y="0"/>
-            <a:ext cx="1066680" cy="1075320"/>
+            <a:ext cx="1066320" cy="1074960"/>
           </a:xfrm>
           <a:prstGeom prst="rect">
             <a:avLst/>
@@ -4842,7 +4678,7 @@
         <p:spPr>
           <a:xfrm>
             <a:off x="2448000" y="0"/>
-            <a:ext cx="7683840" cy="1061280"/>
+            <a:ext cx="7683480" cy="1060920"/>
           </a:xfrm>
           <a:prstGeom prst="rect">
             <a:avLst/>
@@ -4900,10 +4736,10 @@
   <p:timing>
     <p:tnLst>
       <p:par>
-        <p:cTn id="193" dur="indefinite" restart="never" nodeType="tmRoot">
+        <p:cTn id="21" dur="indefinite" restart="never" nodeType="tmRoot">
           <p:childTnLst>
             <p:seq>
-              <p:cTn id="194" nodeType="mainSeq"/>
+              <p:cTn id="22" nodeType="mainSeq"/>
               <p:prevCondLst>
                 <p:cond delay="0" evt="onPrev">
                   <p:tgtEl>
@@ -4953,7 +4789,7 @@
         <p:spPr>
           <a:xfrm>
             <a:off x="504000" y="1467720"/>
-            <a:ext cx="9068400" cy="1258920"/>
+            <a:ext cx="9068040" cy="1258560"/>
           </a:xfrm>
           <a:prstGeom prst="rect">
             <a:avLst/>
@@ -5015,7 +4851,7 @@
         <p:spPr>
           <a:xfrm>
             <a:off x="504000" y="2728440"/>
-            <a:ext cx="9068400" cy="4381200"/>
+            <a:ext cx="9068040" cy="4380840"/>
           </a:xfrm>
           <a:prstGeom prst="rect">
             <a:avLst/>
@@ -5034,7 +4870,7 @@
         <p:txBody>
           <a:bodyPr lIns="0" rIns="0" tIns="0" bIns="0"/>
           <a:p>
-            <a:pPr marL="432000" indent="-320760">
+            <a:pPr marL="432000" indent="-320400">
               <a:lnSpc>
                 <a:spcPct val="100000"/>
               </a:lnSpc>
@@ -5073,7 +4909,7 @@
             </a:endParaRPr>
           </a:p>
           <a:p>
-            <a:pPr marL="432000" indent="-320760">
+            <a:pPr marL="432000" indent="-320400">
               <a:lnSpc>
                 <a:spcPct val="100000"/>
               </a:lnSpc>
@@ -5128,7 +4964,7 @@
             </a:endParaRPr>
           </a:p>
           <a:p>
-            <a:pPr marL="432000" indent="-320760">
+            <a:pPr marL="432000" indent="-320400">
               <a:lnSpc>
                 <a:spcPct val="100000"/>
               </a:lnSpc>
@@ -5167,7 +5003,7 @@
             </a:endParaRPr>
           </a:p>
           <a:p>
-            <a:pPr marL="432000" indent="-320760">
+            <a:pPr marL="432000" indent="-320400">
               <a:lnSpc>
                 <a:spcPct val="100000"/>
               </a:lnSpc>
@@ -5206,7 +5042,7 @@
             </a:endParaRPr>
           </a:p>
           <a:p>
-            <a:pPr lvl="3" marL="864000" indent="-215280">
+            <a:pPr lvl="3" marL="864000" indent="-214920">
               <a:lnSpc>
                 <a:spcPct val="100000"/>
               </a:lnSpc>
@@ -5261,7 +5097,7 @@
             </a:endParaRPr>
           </a:p>
           <a:p>
-            <a:pPr lvl="3" marL="864000" indent="-215280">
+            <a:pPr lvl="3" marL="864000" indent="-214920">
               <a:lnSpc>
                 <a:spcPct val="100000"/>
               </a:lnSpc>
@@ -5316,7 +5152,7 @@
             </a:endParaRPr>
           </a:p>
           <a:p>
-            <a:pPr lvl="3" marL="864000" indent="-215280">
+            <a:pPr lvl="3" marL="864000" indent="-214920">
               <a:lnSpc>
                 <a:spcPct val="100000"/>
               </a:lnSpc>
@@ -5400,7 +5236,7 @@
         <p:spPr>
           <a:xfrm>
             <a:off x="0" y="0"/>
-            <a:ext cx="10076760" cy="1047240"/>
+            <a:ext cx="10076400" cy="1046880"/>
           </a:xfrm>
           <a:prstGeom prst="rect">
             <a:avLst/>
@@ -5423,7 +5259,7 @@
         <p:spPr>
           <a:xfrm>
             <a:off x="39240" y="0"/>
-            <a:ext cx="1066680" cy="1075320"/>
+            <a:ext cx="1066320" cy="1074960"/>
           </a:xfrm>
           <a:prstGeom prst="rect">
             <a:avLst/>
@@ -5442,7 +5278,7 @@
         <p:spPr>
           <a:xfrm>
             <a:off x="2448000" y="0"/>
-            <a:ext cx="7683840" cy="1061280"/>
+            <a:ext cx="7683480" cy="1060920"/>
           </a:xfrm>
           <a:prstGeom prst="rect">
             <a:avLst/>
@@ -5503,250 +5339,7 @@
         <p:cTn id="3" dur="indefinite" restart="never" nodeType="tmRoot">
           <p:childTnLst>
             <p:seq>
-              <p:cTn id="4" nodeType="mainSeq">
-                <p:childTnLst>
-                  <p:par>
-                    <p:cTn id="5" fill="freeze">
-                      <p:stCondLst>
-                        <p:cond delay="indefinite"/>
-                      </p:stCondLst>
-                      <p:childTnLst>
-                        <p:par>
-                          <p:cTn id="6" fill="freeze">
-                            <p:stCondLst>
-                              <p:cond delay="0"/>
-                            </p:stCondLst>
-                            <p:childTnLst>
-                              <p:par>
-                                <p:cTn id="7" nodeType="clickEffect" fill="hold" presetClass="entr" presetID="1">
-                                  <p:stCondLst>
-                                    <p:cond delay="0"/>
-                                  </p:stCondLst>
-                                  <p:childTnLst>
-                                    <p:set>
-                                      <p:cBhvr>
-                                        <p:cTn id="8" dur="1" fill="hold">
-                                          <p:stCondLst>
-                                            <p:cond delay="0"/>
-                                          </p:stCondLst>
-                                        </p:cTn>
-                                        <p:tgtEl>
-                                          <p:spTgt spid="78">
-                                            <p:txEl>
-                                              <p:pRg st="0" end="50"/>
-                                            </p:txEl>
-                                          </p:spTgt>
-                                        </p:tgtEl>
-                                        <p:attrNameLst>
-                                          <p:attrName>style.visibility</p:attrName>
-                                        </p:attrNameLst>
-                                      </p:cBhvr>
-                                      <p:to>
-                                        <p:strVal val="visible"/>
-                                      </p:to>
-                                    </p:set>
-                                  </p:childTnLst>
-                                </p:cTn>
-                              </p:par>
-                            </p:childTnLst>
-                          </p:cTn>
-                        </p:par>
-                      </p:childTnLst>
-                    </p:cTn>
-                  </p:par>
-                  <p:par>
-                    <p:cTn id="9" fill="freeze">
-                      <p:stCondLst>
-                        <p:cond delay="indefinite"/>
-                      </p:stCondLst>
-                      <p:childTnLst>
-                        <p:par>
-                          <p:cTn id="10" fill="freeze">
-                            <p:stCondLst>
-                              <p:cond delay="0"/>
-                            </p:stCondLst>
-                            <p:childTnLst>
-                              <p:par>
-                                <p:cTn id="11" nodeType="clickEffect" fill="hold" presetClass="entr" presetID="1">
-                                  <p:stCondLst>
-                                    <p:cond delay="0"/>
-                                  </p:stCondLst>
-                                  <p:childTnLst>
-                                    <p:set>
-                                      <p:cBhvr>
-                                        <p:cTn id="12" dur="1" fill="hold">
-                                          <p:stCondLst>
-                                            <p:cond delay="0"/>
-                                          </p:stCondLst>
-                                        </p:cTn>
-                                        <p:tgtEl>
-                                          <p:spTgt spid="78">
-                                            <p:txEl>
-                                              <p:pRg st="50" end="102"/>
-                                            </p:txEl>
-                                          </p:spTgt>
-                                        </p:tgtEl>
-                                        <p:attrNameLst>
-                                          <p:attrName>style.visibility</p:attrName>
-                                        </p:attrNameLst>
-                                      </p:cBhvr>
-                                      <p:to>
-                                        <p:strVal val="visible"/>
-                                      </p:to>
-                                    </p:set>
-                                  </p:childTnLst>
-                                </p:cTn>
-                              </p:par>
-                            </p:childTnLst>
-                          </p:cTn>
-                        </p:par>
-                      </p:childTnLst>
-                    </p:cTn>
-                  </p:par>
-                  <p:par>
-                    <p:cTn id="13" fill="freeze">
-                      <p:stCondLst>
-                        <p:cond delay="indefinite"/>
-                      </p:stCondLst>
-                      <p:childTnLst>
-                        <p:par>
-                          <p:cTn id="14" fill="freeze">
-                            <p:stCondLst>
-                              <p:cond delay="0"/>
-                            </p:stCondLst>
-                            <p:childTnLst>
-                              <p:par>
-                                <p:cTn id="15" nodeType="clickEffect" fill="hold" presetClass="entr" presetID="1">
-                                  <p:stCondLst>
-                                    <p:cond delay="0"/>
-                                  </p:stCondLst>
-                                  <p:childTnLst>
-                                    <p:set>
-                                      <p:cBhvr>
-                                        <p:cTn id="16" dur="1" fill="hold">
-                                          <p:stCondLst>
-                                            <p:cond delay="0"/>
-                                          </p:stCondLst>
-                                        </p:cTn>
-                                        <p:tgtEl>
-                                          <p:spTgt spid="78">
-                                            <p:txEl>
-                                              <p:pRg st="104" end="122"/>
-                                            </p:txEl>
-                                          </p:spTgt>
-                                        </p:tgtEl>
-                                        <p:attrNameLst>
-                                          <p:attrName>style.visibility</p:attrName>
-                                        </p:attrNameLst>
-                                      </p:cBhvr>
-                                      <p:to>
-                                        <p:strVal val="visible"/>
-                                      </p:to>
-                                    </p:set>
-                                  </p:childTnLst>
-                                </p:cTn>
-                              </p:par>
-                              <p:par>
-                                <p:cTn id="17" nodeType="withEffect" fill="hold" presetClass="entr" presetID="1">
-                                  <p:stCondLst>
-                                    <p:cond delay="0"/>
-                                  </p:stCondLst>
-                                  <p:childTnLst>
-                                    <p:set>
-                                      <p:cBhvr>
-                                        <p:cTn id="18" dur="1" fill="hold">
-                                          <p:stCondLst>
-                                            <p:cond delay="0"/>
-                                          </p:stCondLst>
-                                        </p:cTn>
-                                        <p:tgtEl>
-                                          <p:spTgt spid="78">
-                                            <p:txEl>
-                                              <p:pRg st="122" end="146"/>
-                                            </p:txEl>
-                                          </p:spTgt>
-                                        </p:tgtEl>
-                                        <p:attrNameLst>
-                                          <p:attrName>style.visibility</p:attrName>
-                                        </p:attrNameLst>
-                                      </p:cBhvr>
-                                      <p:to>
-                                        <p:strVal val="visible"/>
-                                      </p:to>
-                                    </p:set>
-                                  </p:childTnLst>
-                                </p:cTn>
-                              </p:par>
-                              <p:par>
-                                <p:cTn id="19" nodeType="withEffect" fill="hold" presetClass="entr" presetID="1">
-                                  <p:stCondLst>
-                                    <p:cond delay="0"/>
-                                  </p:stCondLst>
-                                  <p:childTnLst>
-                                    <p:set>
-                                      <p:cBhvr>
-                                        <p:cTn id="20" dur="1" fill="hold">
-                                          <p:stCondLst>
-                                            <p:cond delay="0"/>
-                                          </p:stCondLst>
-                                        </p:cTn>
-                                        <p:tgtEl>
-                                          <p:spTgt spid="78">
-                                            <p:txEl>
-                                              <p:pRg st="146" end="171"/>
-                                            </p:txEl>
-                                          </p:spTgt>
-                                        </p:tgtEl>
-                                        <p:attrNameLst>
-                                          <p:attrName>style.visibility</p:attrName>
-                                        </p:attrNameLst>
-                                      </p:cBhvr>
-                                      <p:to>
-                                        <p:strVal val="visible"/>
-                                      </p:to>
-                                    </p:set>
-                                  </p:childTnLst>
-                                </p:cTn>
-                              </p:par>
-                              <p:par>
-                                <p:cTn id="21" nodeType="withEffect" fill="hold" presetClass="entr" presetID="1">
-                                  <p:stCondLst>
-                                    <p:cond delay="0"/>
-                                  </p:stCondLst>
-                                  <p:childTnLst>
-                                    <p:set>
-                                      <p:cBhvr>
-                                        <p:cTn id="22" dur="1" fill="hold">
-                                          <p:stCondLst>
-                                            <p:cond delay="0"/>
-                                          </p:stCondLst>
-                                        </p:cTn>
-                                        <p:tgtEl>
-                                          <p:spTgt spid="78">
-                                            <p:txEl>
-                                              <p:pRg st="171" end="200"/>
-                                            </p:txEl>
-                                          </p:spTgt>
-                                        </p:tgtEl>
-                                        <p:attrNameLst>
-                                          <p:attrName>style.visibility</p:attrName>
-                                        </p:attrNameLst>
-                                      </p:cBhvr>
-                                      <p:to>
-                                        <p:strVal val="visible"/>
-                                      </p:to>
-                                    </p:set>
-                                  </p:childTnLst>
-                                </p:cTn>
-                              </p:par>
-                            </p:childTnLst>
-                          </p:cTn>
-                        </p:par>
-                      </p:childTnLst>
-                    </p:cTn>
-                  </p:par>
-                </p:childTnLst>
-              </p:cTn>
+              <p:cTn id="4" nodeType="mainSeq"/>
               <p:prevCondLst>
                 <p:cond delay="0" evt="onPrev">
                   <p:tgtEl>
@@ -5796,7 +5389,7 @@
         <p:spPr>
           <a:xfrm>
             <a:off x="504000" y="1467720"/>
-            <a:ext cx="9068400" cy="1258920"/>
+            <a:ext cx="9068040" cy="1258560"/>
           </a:xfrm>
           <a:prstGeom prst="rect">
             <a:avLst/>
@@ -5858,7 +5451,7 @@
         <p:spPr>
           <a:xfrm>
             <a:off x="504000" y="2728440"/>
-            <a:ext cx="9068400" cy="4381200"/>
+            <a:ext cx="9068040" cy="4380840"/>
           </a:xfrm>
           <a:prstGeom prst="rect">
             <a:avLst/>
@@ -5877,7 +5470,7 @@
         <p:txBody>
           <a:bodyPr lIns="0" rIns="0" tIns="0" bIns="0"/>
           <a:p>
-            <a:pPr marL="432000" indent="-320760">
+            <a:pPr marL="432000" indent="-320400">
               <a:lnSpc>
                 <a:spcPct val="100000"/>
               </a:lnSpc>
@@ -5916,7 +5509,7 @@
             </a:endParaRPr>
           </a:p>
           <a:p>
-            <a:pPr marL="432000" indent="-320760">
+            <a:pPr marL="432000" indent="-320400">
               <a:lnSpc>
                 <a:spcPct val="100000"/>
               </a:lnSpc>
@@ -5955,7 +5548,7 @@
             </a:endParaRPr>
           </a:p>
           <a:p>
-            <a:pPr marL="432000" indent="-320760">
+            <a:pPr marL="432000" indent="-320400">
               <a:lnSpc>
                 <a:spcPct val="100000"/>
               </a:lnSpc>
@@ -5994,7 +5587,7 @@
             </a:endParaRPr>
           </a:p>
           <a:p>
-            <a:pPr marL="432000" indent="-320760">
+            <a:pPr marL="432000" indent="-320400">
               <a:lnSpc>
                 <a:spcPct val="100000"/>
               </a:lnSpc>
@@ -6033,7 +5626,7 @@
             </a:endParaRPr>
           </a:p>
           <a:p>
-            <a:pPr marL="432000" indent="-320760">
+            <a:pPr marL="432000" indent="-320400">
               <a:lnSpc>
                 <a:spcPct val="100000"/>
               </a:lnSpc>
@@ -6086,7 +5679,7 @@
         <p:spPr>
           <a:xfrm>
             <a:off x="0" y="0"/>
-            <a:ext cx="10076760" cy="1047240"/>
+            <a:ext cx="10076400" cy="1046880"/>
           </a:xfrm>
           <a:prstGeom prst="rect">
             <a:avLst/>
@@ -6109,7 +5702,7 @@
         <p:spPr>
           <a:xfrm>
             <a:off x="39240" y="0"/>
-            <a:ext cx="1066680" cy="1075320"/>
+            <a:ext cx="1066320" cy="1074960"/>
           </a:xfrm>
           <a:prstGeom prst="rect">
             <a:avLst/>
@@ -6128,7 +5721,7 @@
         <p:spPr>
           <a:xfrm>
             <a:off x="2448000" y="0"/>
-            <a:ext cx="7683840" cy="1061280"/>
+            <a:ext cx="7683480" cy="1060920"/>
           </a:xfrm>
           <a:prstGeom prst="rect">
             <a:avLst/>
@@ -6186,258 +5779,10 @@
   <p:timing>
     <p:tnLst>
       <p:par>
-        <p:cTn id="23" dur="indefinite" restart="never" nodeType="tmRoot">
+        <p:cTn id="5" dur="indefinite" restart="never" nodeType="tmRoot">
           <p:childTnLst>
             <p:seq>
-              <p:cTn id="24" nodeType="mainSeq">
-                <p:childTnLst>
-                  <p:par>
-                    <p:cTn id="25" fill="freeze">
-                      <p:stCondLst>
-                        <p:cond delay="indefinite"/>
-                      </p:stCondLst>
-                      <p:childTnLst>
-                        <p:par>
-                          <p:cTn id="26" fill="freeze">
-                            <p:stCondLst>
-                              <p:cond delay="0"/>
-                            </p:stCondLst>
-                            <p:childTnLst>
-                              <p:par>
-                                <p:cTn id="27" nodeType="clickEffect" fill="hold" presetClass="entr" presetID="1">
-                                  <p:stCondLst>
-                                    <p:cond delay="0"/>
-                                  </p:stCondLst>
-                                  <p:childTnLst>
-                                    <p:set>
-                                      <p:cBhvr>
-                                        <p:cTn id="28" dur="1" fill="hold">
-                                          <p:stCondLst>
-                                            <p:cond delay="0"/>
-                                          </p:stCondLst>
-                                        </p:cTn>
-                                        <p:tgtEl>
-                                          <p:spTgt spid="83">
-                                            <p:txEl>
-                                              <p:pRg st="0" end="42"/>
-                                            </p:txEl>
-                                          </p:spTgt>
-                                        </p:tgtEl>
-                                        <p:attrNameLst>
-                                          <p:attrName>style.visibility</p:attrName>
-                                        </p:attrNameLst>
-                                      </p:cBhvr>
-                                      <p:to>
-                                        <p:strVal val="visible"/>
-                                      </p:to>
-                                    </p:set>
-                                  </p:childTnLst>
-                                </p:cTn>
-                              </p:par>
-                            </p:childTnLst>
-                          </p:cTn>
-                        </p:par>
-                      </p:childTnLst>
-                    </p:cTn>
-                  </p:par>
-                  <p:par>
-                    <p:cTn id="29" fill="freeze">
-                      <p:stCondLst>
-                        <p:cond delay="indefinite"/>
-                      </p:stCondLst>
-                      <p:childTnLst>
-                        <p:par>
-                          <p:cTn id="30" fill="freeze">
-                            <p:stCondLst>
-                              <p:cond delay="0"/>
-                            </p:stCondLst>
-                            <p:childTnLst>
-                              <p:par>
-                                <p:cTn id="31" nodeType="clickEffect" fill="hold" presetClass="entr" presetID="1">
-                                  <p:stCondLst>
-                                    <p:cond delay="0"/>
-                                  </p:stCondLst>
-                                  <p:childTnLst>
-                                    <p:set>
-                                      <p:cBhvr>
-                                        <p:cTn id="32" dur="1" fill="hold">
-                                          <p:stCondLst>
-                                            <p:cond delay="0"/>
-                                          </p:stCondLst>
-                                        </p:cTn>
-                                        <p:tgtEl>
-                                          <p:spTgt spid="83">
-                                            <p:txEl>
-                                              <p:pRg st="42" end="77"/>
-                                            </p:txEl>
-                                          </p:spTgt>
-                                        </p:tgtEl>
-                                        <p:attrNameLst>
-                                          <p:attrName>style.visibility</p:attrName>
-                                        </p:attrNameLst>
-                                      </p:cBhvr>
-                                      <p:to>
-                                        <p:strVal val="visible"/>
-                                      </p:to>
-                                    </p:set>
-                                  </p:childTnLst>
-                                </p:cTn>
-                              </p:par>
-                            </p:childTnLst>
-                          </p:cTn>
-                        </p:par>
-                      </p:childTnLst>
-                    </p:cTn>
-                  </p:par>
-                  <p:par>
-                    <p:cTn id="33" fill="freeze">
-                      <p:stCondLst>
-                        <p:cond delay="indefinite"/>
-                      </p:stCondLst>
-                      <p:childTnLst>
-                        <p:par>
-                          <p:cTn id="34" fill="freeze">
-                            <p:stCondLst>
-                              <p:cond delay="0"/>
-                            </p:stCondLst>
-                            <p:childTnLst>
-                              <p:par>
-                                <p:cTn id="35" nodeType="clickEffect" fill="hold" presetClass="entr" presetID="1">
-                                  <p:stCondLst>
-                                    <p:cond delay="0"/>
-                                  </p:stCondLst>
-                                  <p:childTnLst>
-                                    <p:set>
-                                      <p:cBhvr>
-                                        <p:cTn id="36" dur="1" fill="hold">
-                                          <p:stCondLst>
-                                            <p:cond delay="0"/>
-                                          </p:stCondLst>
-                                        </p:cTn>
-                                        <p:tgtEl>
-                                          <p:spTgt spid="83">
-                                            <p:txEl>
-                                              <p:pRg st="77" end="121"/>
-                                            </p:txEl>
-                                          </p:spTgt>
-                                        </p:tgtEl>
-                                        <p:attrNameLst>
-                                          <p:attrName>style.visibility</p:attrName>
-                                        </p:attrNameLst>
-                                      </p:cBhvr>
-                                      <p:to>
-                                        <p:strVal val="visible"/>
-                                      </p:to>
-                                    </p:set>
-                                  </p:childTnLst>
-                                </p:cTn>
-                              </p:par>
-                            </p:childTnLst>
-                          </p:cTn>
-                        </p:par>
-                      </p:childTnLst>
-                    </p:cTn>
-                  </p:par>
-                  <p:par>
-                    <p:cTn id="37" fill="freeze">
-                      <p:stCondLst>
-                        <p:cond delay="indefinite"/>
-                      </p:stCondLst>
-                      <p:childTnLst>
-                        <p:par>
-                          <p:cTn id="38" fill="freeze">
-                            <p:stCondLst>
-                              <p:cond delay="0"/>
-                            </p:stCondLst>
-                            <p:childTnLst>
-                              <p:par>
-                                <p:cTn id="39" nodeType="clickEffect" fill="hold" presetClass="entr" presetID="1">
-                                  <p:stCondLst>
-                                    <p:cond delay="0"/>
-                                  </p:stCondLst>
-                                  <p:childTnLst>
-                                    <p:set>
-                                      <p:cBhvr>
-                                        <p:cTn id="40" dur="1" fill="hold">
-                                          <p:stCondLst>
-                                            <p:cond delay="0"/>
-                                          </p:stCondLst>
-                                        </p:cTn>
-                                        <p:tgtEl>
-                                          <p:spTgt spid="83">
-                                            <p:txEl>
-                                              <p:pRg st="121" end="159"/>
-                                            </p:txEl>
-                                          </p:spTgt>
-                                        </p:tgtEl>
-                                        <p:attrNameLst>
-                                          <p:attrName>style.visibility</p:attrName>
-                                        </p:attrNameLst>
-                                      </p:cBhvr>
-                                      <p:to>
-                                        <p:strVal val="visible"/>
-                                      </p:to>
-                                    </p:set>
-                                  </p:childTnLst>
-                                </p:cTn>
-                              </p:par>
-                            </p:childTnLst>
-                          </p:cTn>
-                        </p:par>
-                      </p:childTnLst>
-                    </p:cTn>
-                  </p:par>
-                  <p:par>
-                    <p:cTn id="41" fill="freeze">
-                      <p:stCondLst>
-                        <p:cond delay="indefinite"/>
-                      </p:stCondLst>
-                      <p:childTnLst>
-                        <p:par>
-                          <p:cTn id="42" fill="freeze">
-                            <p:stCondLst>
-                              <p:cond delay="0"/>
-                            </p:stCondLst>
-                            <p:childTnLst>
-                              <p:par>
-                                <p:cTn id="43" nodeType="clickEffect" fill="hold" presetClass="entr" presetID="1">
-                                  <p:stCondLst>
-                                    <p:cond delay="0"/>
-                                  </p:stCondLst>
-                                  <p:childTnLst>
-                                    <p:set>
-                                      <p:cBhvr>
-                                        <p:cTn id="44" dur="1" fill="hold">
-                                          <p:stCondLst>
-                                            <p:cond delay="0"/>
-                                          </p:stCondLst>
-                                        </p:cTn>
-                                        <p:tgtEl>
-                                          <p:spTgt spid="83">
-                                            <p:txEl>
-                                              <p:pRg st="159" end="228"/>
-                                            </p:txEl>
-                                          </p:spTgt>
-                                        </p:tgtEl>
-                                        <p:attrNameLst>
-                                          <p:attrName>style.visibility</p:attrName>
-                                        </p:attrNameLst>
-                                      </p:cBhvr>
-                                      <p:to>
-                                        <p:strVal val="visible"/>
-                                      </p:to>
-                                    </p:set>
-                                  </p:childTnLst>
-                                </p:cTn>
-                              </p:par>
-                            </p:childTnLst>
-                          </p:cTn>
-                        </p:par>
-                      </p:childTnLst>
-                    </p:cTn>
-                  </p:par>
-                </p:childTnLst>
-              </p:cTn>
+              <p:cTn id="6" nodeType="mainSeq"/>
               <p:prevCondLst>
                 <p:cond delay="0" evt="onPrev">
                   <p:tgtEl>
@@ -6487,7 +5832,7 @@
         <p:spPr>
           <a:xfrm>
             <a:off x="504000" y="1467720"/>
-            <a:ext cx="9068400" cy="1258920"/>
+            <a:ext cx="9068040" cy="1258560"/>
           </a:xfrm>
           <a:prstGeom prst="rect">
             <a:avLst/>
@@ -6549,7 +5894,7 @@
         <p:spPr>
           <a:xfrm>
             <a:off x="504000" y="2728440"/>
-            <a:ext cx="9068400" cy="4381200"/>
+            <a:ext cx="9068040" cy="4380840"/>
           </a:xfrm>
           <a:prstGeom prst="rect">
             <a:avLst/>
@@ -6568,7 +5913,7 @@
         <p:txBody>
           <a:bodyPr lIns="0" rIns="0" tIns="0" bIns="0"/>
           <a:p>
-            <a:pPr marL="432000" indent="-320760">
+            <a:pPr marL="432000" indent="-320400">
               <a:lnSpc>
                 <a:spcPct val="100000"/>
               </a:lnSpc>
@@ -6607,7 +5952,7 @@
             </a:endParaRPr>
           </a:p>
           <a:p>
-            <a:pPr marL="432000" indent="-320760">
+            <a:pPr marL="432000" indent="-320400">
               <a:lnSpc>
                 <a:spcPct val="100000"/>
               </a:lnSpc>
@@ -6646,7 +5991,7 @@
             </a:endParaRPr>
           </a:p>
           <a:p>
-            <a:pPr marL="432000" indent="-320760">
+            <a:pPr marL="432000" indent="-320400">
               <a:lnSpc>
                 <a:spcPct val="100000"/>
               </a:lnSpc>
@@ -6685,7 +6030,7 @@
             </a:endParaRPr>
           </a:p>
           <a:p>
-            <a:pPr lvl="4" marL="1080000" indent="-216000">
+            <a:pPr lvl="4" marL="1080000" indent="-215640">
               <a:lnSpc>
                 <a:spcPct val="100000"/>
               </a:lnSpc>
@@ -6724,7 +6069,7 @@
             </a:endParaRPr>
           </a:p>
           <a:p>
-            <a:pPr lvl="4" marL="1080000" indent="-216000">
+            <a:pPr lvl="4" marL="1080000" indent="-215640">
               <a:lnSpc>
                 <a:spcPct val="100000"/>
               </a:lnSpc>
@@ -6777,7 +6122,7 @@
         <p:spPr>
           <a:xfrm>
             <a:off x="0" y="0"/>
-            <a:ext cx="10076760" cy="1047240"/>
+            <a:ext cx="10076400" cy="1046880"/>
           </a:xfrm>
           <a:prstGeom prst="rect">
             <a:avLst/>
@@ -6800,7 +6145,7 @@
         <p:spPr>
           <a:xfrm>
             <a:off x="39240" y="0"/>
-            <a:ext cx="1066680" cy="1075320"/>
+            <a:ext cx="1066320" cy="1074960"/>
           </a:xfrm>
           <a:prstGeom prst="rect">
             <a:avLst/>
@@ -6819,7 +6164,7 @@
         <p:spPr>
           <a:xfrm>
             <a:off x="2448000" y="0"/>
-            <a:ext cx="7683840" cy="1061280"/>
+            <a:ext cx="7683480" cy="1060920"/>
           </a:xfrm>
           <a:prstGeom prst="rect">
             <a:avLst/>
@@ -6877,258 +6222,10 @@
   <p:timing>
     <p:tnLst>
       <p:par>
-        <p:cTn id="45" dur="indefinite" restart="never" nodeType="tmRoot">
+        <p:cTn id="7" dur="indefinite" restart="never" nodeType="tmRoot">
           <p:childTnLst>
             <p:seq>
-              <p:cTn id="46" nodeType="mainSeq">
-                <p:childTnLst>
-                  <p:par>
-                    <p:cTn id="47" fill="freeze">
-                      <p:stCondLst>
-                        <p:cond delay="indefinite"/>
-                      </p:stCondLst>
-                      <p:childTnLst>
-                        <p:par>
-                          <p:cTn id="48" fill="freeze">
-                            <p:stCondLst>
-                              <p:cond delay="0"/>
-                            </p:stCondLst>
-                            <p:childTnLst>
-                              <p:par>
-                                <p:cTn id="49" nodeType="clickEffect" fill="hold" presetClass="entr" presetID="1">
-                                  <p:stCondLst>
-                                    <p:cond delay="0"/>
-                                  </p:stCondLst>
-                                  <p:childTnLst>
-                                    <p:set>
-                                      <p:cBhvr>
-                                        <p:cTn id="50" dur="1" fill="hold">
-                                          <p:stCondLst>
-                                            <p:cond delay="0"/>
-                                          </p:stCondLst>
-                                        </p:cTn>
-                                        <p:tgtEl>
-                                          <p:spTgt spid="88">
-                                            <p:txEl>
-                                              <p:pRg st="0" end="22"/>
-                                            </p:txEl>
-                                          </p:spTgt>
-                                        </p:tgtEl>
-                                        <p:attrNameLst>
-                                          <p:attrName>style.visibility</p:attrName>
-                                        </p:attrNameLst>
-                                      </p:cBhvr>
-                                      <p:to>
-                                        <p:strVal val="visible"/>
-                                      </p:to>
-                                    </p:set>
-                                  </p:childTnLst>
-                                </p:cTn>
-                              </p:par>
-                            </p:childTnLst>
-                          </p:cTn>
-                        </p:par>
-                      </p:childTnLst>
-                    </p:cTn>
-                  </p:par>
-                  <p:par>
-                    <p:cTn id="51" fill="freeze">
-                      <p:stCondLst>
-                        <p:cond delay="indefinite"/>
-                      </p:stCondLst>
-                      <p:childTnLst>
-                        <p:par>
-                          <p:cTn id="52" fill="freeze">
-                            <p:stCondLst>
-                              <p:cond delay="0"/>
-                            </p:stCondLst>
-                            <p:childTnLst>
-                              <p:par>
-                                <p:cTn id="53" nodeType="clickEffect" fill="hold" presetClass="entr" presetID="1">
-                                  <p:stCondLst>
-                                    <p:cond delay="0"/>
-                                  </p:stCondLst>
-                                  <p:childTnLst>
-                                    <p:set>
-                                      <p:cBhvr>
-                                        <p:cTn id="54" dur="1" fill="hold">
-                                          <p:stCondLst>
-                                            <p:cond delay="0"/>
-                                          </p:stCondLst>
-                                        </p:cTn>
-                                        <p:tgtEl>
-                                          <p:spTgt spid="88">
-                                            <p:txEl>
-                                              <p:pRg st="22" end="57"/>
-                                            </p:txEl>
-                                          </p:spTgt>
-                                        </p:tgtEl>
-                                        <p:attrNameLst>
-                                          <p:attrName>style.visibility</p:attrName>
-                                        </p:attrNameLst>
-                                      </p:cBhvr>
-                                      <p:to>
-                                        <p:strVal val="visible"/>
-                                      </p:to>
-                                    </p:set>
-                                  </p:childTnLst>
-                                </p:cTn>
-                              </p:par>
-                            </p:childTnLst>
-                          </p:cTn>
-                        </p:par>
-                      </p:childTnLst>
-                    </p:cTn>
-                  </p:par>
-                  <p:par>
-                    <p:cTn id="55" fill="freeze">
-                      <p:stCondLst>
-                        <p:cond delay="indefinite"/>
-                      </p:stCondLst>
-                      <p:childTnLst>
-                        <p:par>
-                          <p:cTn id="56" fill="freeze">
-                            <p:stCondLst>
-                              <p:cond delay="0"/>
-                            </p:stCondLst>
-                            <p:childTnLst>
-                              <p:par>
-                                <p:cTn id="57" nodeType="clickEffect" fill="hold" presetClass="entr" presetID="1">
-                                  <p:stCondLst>
-                                    <p:cond delay="0"/>
-                                  </p:stCondLst>
-                                  <p:childTnLst>
-                                    <p:set>
-                                      <p:cBhvr>
-                                        <p:cTn id="58" dur="1" fill="hold">
-                                          <p:stCondLst>
-                                            <p:cond delay="0"/>
-                                          </p:stCondLst>
-                                        </p:cTn>
-                                        <p:tgtEl>
-                                          <p:spTgt spid="88">
-                                            <p:txEl>
-                                              <p:pRg st="57" end="81"/>
-                                            </p:txEl>
-                                          </p:spTgt>
-                                        </p:tgtEl>
-                                        <p:attrNameLst>
-                                          <p:attrName>style.visibility</p:attrName>
-                                        </p:attrNameLst>
-                                      </p:cBhvr>
-                                      <p:to>
-                                        <p:strVal val="visible"/>
-                                      </p:to>
-                                    </p:set>
-                                  </p:childTnLst>
-                                </p:cTn>
-                              </p:par>
-                            </p:childTnLst>
-                          </p:cTn>
-                        </p:par>
-                      </p:childTnLst>
-                    </p:cTn>
-                  </p:par>
-                  <p:par>
-                    <p:cTn id="59" fill="freeze">
-                      <p:stCondLst>
-                        <p:cond delay="indefinite"/>
-                      </p:stCondLst>
-                      <p:childTnLst>
-                        <p:par>
-                          <p:cTn id="60" fill="freeze">
-                            <p:stCondLst>
-                              <p:cond delay="0"/>
-                            </p:stCondLst>
-                            <p:childTnLst>
-                              <p:par>
-                                <p:cTn id="61" nodeType="clickEffect" fill="hold" presetClass="entr" presetID="1">
-                                  <p:stCondLst>
-                                    <p:cond delay="0"/>
-                                  </p:stCondLst>
-                                  <p:childTnLst>
-                                    <p:set>
-                                      <p:cBhvr>
-                                        <p:cTn id="62" dur="1" fill="hold">
-                                          <p:stCondLst>
-                                            <p:cond delay="0"/>
-                                          </p:stCondLst>
-                                        </p:cTn>
-                                        <p:tgtEl>
-                                          <p:spTgt spid="88">
-                                            <p:txEl>
-                                              <p:pRg st="81" end="118"/>
-                                            </p:txEl>
-                                          </p:spTgt>
-                                        </p:tgtEl>
-                                        <p:attrNameLst>
-                                          <p:attrName>style.visibility</p:attrName>
-                                        </p:attrNameLst>
-                                      </p:cBhvr>
-                                      <p:to>
-                                        <p:strVal val="visible"/>
-                                      </p:to>
-                                    </p:set>
-                                  </p:childTnLst>
-                                </p:cTn>
-                              </p:par>
-                            </p:childTnLst>
-                          </p:cTn>
-                        </p:par>
-                      </p:childTnLst>
-                    </p:cTn>
-                  </p:par>
-                  <p:par>
-                    <p:cTn id="63" fill="freeze">
-                      <p:stCondLst>
-                        <p:cond delay="indefinite"/>
-                      </p:stCondLst>
-                      <p:childTnLst>
-                        <p:par>
-                          <p:cTn id="64" fill="freeze">
-                            <p:stCondLst>
-                              <p:cond delay="0"/>
-                            </p:stCondLst>
-                            <p:childTnLst>
-                              <p:par>
-                                <p:cTn id="65" nodeType="clickEffect" fill="hold" presetClass="entr" presetID="1">
-                                  <p:stCondLst>
-                                    <p:cond delay="0"/>
-                                  </p:stCondLst>
-                                  <p:childTnLst>
-                                    <p:set>
-                                      <p:cBhvr>
-                                        <p:cTn id="66" dur="1" fill="hold">
-                                          <p:stCondLst>
-                                            <p:cond delay="0"/>
-                                          </p:stCondLst>
-                                        </p:cTn>
-                                        <p:tgtEl>
-                                          <p:spTgt spid="88">
-                                            <p:txEl>
-                                              <p:pRg st="118" end="137"/>
-                                            </p:txEl>
-                                          </p:spTgt>
-                                        </p:tgtEl>
-                                        <p:attrNameLst>
-                                          <p:attrName>style.visibility</p:attrName>
-                                        </p:attrNameLst>
-                                      </p:cBhvr>
-                                      <p:to>
-                                        <p:strVal val="visible"/>
-                                      </p:to>
-                                    </p:set>
-                                  </p:childTnLst>
-                                </p:cTn>
-                              </p:par>
-                            </p:childTnLst>
-                          </p:cTn>
-                        </p:par>
-                      </p:childTnLst>
-                    </p:cTn>
-                  </p:par>
-                </p:childTnLst>
-              </p:cTn>
+              <p:cTn id="8" nodeType="mainSeq"/>
               <p:prevCondLst>
                 <p:cond delay="0" evt="onPrev">
                   <p:tgtEl>
@@ -7178,7 +6275,7 @@
         <p:spPr>
           <a:xfrm>
             <a:off x="504000" y="1404360"/>
-            <a:ext cx="9068760" cy="3165120"/>
+            <a:ext cx="9068400" cy="3164760"/>
           </a:xfrm>
           <a:prstGeom prst="rect">
             <a:avLst/>
@@ -7277,7 +6374,7 @@
         <p:spPr>
           <a:xfrm>
             <a:off x="0" y="0"/>
-            <a:ext cx="10077120" cy="1047600"/>
+            <a:ext cx="10076760" cy="1047240"/>
           </a:xfrm>
           <a:prstGeom prst="rect">
             <a:avLst/>
@@ -7300,7 +6397,7 @@
         <p:spPr>
           <a:xfrm>
             <a:off x="39240" y="0"/>
-            <a:ext cx="1067040" cy="1075680"/>
+            <a:ext cx="1066680" cy="1075320"/>
           </a:xfrm>
           <a:prstGeom prst="rect">
             <a:avLst/>
@@ -7323,7 +6420,7 @@
         <p:spPr>
           <a:xfrm>
             <a:off x="3718440" y="4659840"/>
-            <a:ext cx="2640240" cy="2661120"/>
+            <a:ext cx="2639880" cy="2660760"/>
           </a:xfrm>
           <a:prstGeom prst="rect">
             <a:avLst/>
@@ -7342,7 +6439,7 @@
         <p:spPr>
           <a:xfrm>
             <a:off x="2448000" y="0"/>
-            <a:ext cx="7683840" cy="1061280"/>
+            <a:ext cx="7683480" cy="1060920"/>
           </a:xfrm>
           <a:prstGeom prst="rect">
             <a:avLst/>
@@ -7400,10 +6497,10 @@
   <p:timing>
     <p:tnLst>
       <p:par>
-        <p:cTn id="67" dur="indefinite" restart="never" nodeType="tmRoot">
+        <p:cTn id="9" dur="indefinite" restart="never" nodeType="tmRoot">
           <p:childTnLst>
             <p:seq>
-              <p:cTn id="68" nodeType="mainSeq"/>
+              <p:cTn id="10" nodeType="mainSeq"/>
               <p:prevCondLst>
                 <p:cond delay="0" evt="onPrev">
                   <p:tgtEl>
@@ -7453,7 +6550,7 @@
         <p:spPr>
           <a:xfrm>
             <a:off x="504000" y="1467720"/>
-            <a:ext cx="9068400" cy="1258920"/>
+            <a:ext cx="9068040" cy="1258560"/>
           </a:xfrm>
           <a:prstGeom prst="rect">
             <a:avLst/>
@@ -7515,7 +6612,7 @@
         <p:spPr>
           <a:xfrm>
             <a:off x="504000" y="2728440"/>
-            <a:ext cx="9068400" cy="4381200"/>
+            <a:ext cx="9068040" cy="4380840"/>
           </a:xfrm>
           <a:prstGeom prst="rect">
             <a:avLst/>
@@ -7534,7 +6631,7 @@
         <p:txBody>
           <a:bodyPr lIns="0" rIns="0" tIns="0" bIns="0"/>
           <a:p>
-            <a:pPr marL="432000" indent="-320760">
+            <a:pPr marL="432000" indent="-320400">
               <a:lnSpc>
                 <a:spcPct val="100000"/>
               </a:lnSpc>
@@ -7604,7 +6701,7 @@
             </a:endParaRPr>
           </a:p>
           <a:p>
-            <a:pPr marL="432000" indent="-320760">
+            <a:pPr marL="432000" indent="-320400">
               <a:lnSpc>
                 <a:spcPct val="100000"/>
               </a:lnSpc>
@@ -7673,7 +6770,7 @@
             </a:endParaRPr>
           </a:p>
           <a:p>
-            <a:pPr lvl="4" marL="1080000" indent="-214920">
+            <a:pPr lvl="4" marL="1080000" indent="-214560">
               <a:lnSpc>
                 <a:spcPct val="100000"/>
               </a:lnSpc>
@@ -7697,7 +6794,7 @@
                 <a:latin typeface="Arial"/>
                 <a:ea typeface="DejaVu Sans"/>
               </a:rPr>
-              <a:t>14</a:t>
+              <a:t>7</a:t>
             </a:r>
             <a:r>
               <a:rPr b="0" lang="en-GB" sz="2800" spc="-1" strike="noStrike" baseline="101000">
@@ -7742,7 +6839,7 @@
             </a:endParaRPr>
           </a:p>
           <a:p>
-            <a:pPr lvl="4" marL="1080000" indent="-214920">
+            <a:pPr lvl="4" marL="1080000" indent="-214560">
               <a:lnSpc>
                 <a:spcPct val="100000"/>
               </a:lnSpc>
@@ -7766,7 +6863,7 @@
                 <a:latin typeface="Arial"/>
                 <a:ea typeface="DejaVu Sans"/>
               </a:rPr>
-              <a:t>21</a:t>
+              <a:t>14</a:t>
             </a:r>
             <a:r>
               <a:rPr b="0" lang="en-GB" sz="2800" spc="-1" strike="noStrike" baseline="101000">
@@ -7781,7 +6878,7 @@
                 <a:latin typeface="Arial"/>
                 <a:ea typeface="DejaVu Sans"/>
               </a:rPr>
-              <a:t>st</a:t>
+              <a:t>th</a:t>
             </a:r>
             <a:r>
               <a:rPr b="0" lang="en-GB" sz="2800" spc="-1" strike="noStrike">
@@ -7811,7 +6908,7 @@
             </a:endParaRPr>
           </a:p>
           <a:p>
-            <a:pPr lvl="4" marL="1080000" indent="-214920">
+            <a:pPr lvl="4" marL="1080000" indent="-214560">
               <a:lnSpc>
                 <a:spcPct val="100000"/>
               </a:lnSpc>
@@ -7835,7 +6932,7 @@
                 <a:latin typeface="Arial"/>
                 <a:ea typeface="DejaVu Sans"/>
               </a:rPr>
-              <a:t>28</a:t>
+              <a:t>21</a:t>
             </a:r>
             <a:r>
               <a:rPr b="0" lang="en-GB" sz="2800" spc="-1" strike="noStrike" baseline="101000">
@@ -7850,7 +6947,7 @@
                 <a:latin typeface="Arial"/>
                 <a:ea typeface="DejaVu Sans"/>
               </a:rPr>
-              <a:t>th</a:t>
+              <a:t>st</a:t>
             </a:r>
             <a:r>
               <a:rPr b="0" lang="en-GB" sz="2800" spc="-1" strike="noStrike">
@@ -7865,37 +6962,7 @@
                 <a:latin typeface="Arial"/>
                 <a:ea typeface="DejaVu Sans"/>
               </a:rPr>
-              <a:t> February 2018 – </a:t>
-            </a:r>
-            <a:r>
-              <a:rPr b="1" lang="en-GB" sz="2800" spc="-1" strike="noStrike" u="sng">
-                <a:solidFill>
-                  <a:srgbClr val="000000"/>
-                </a:solidFill>
-                <a:uFill>
-                  <a:solidFill>
-                    <a:srgbClr val="ffffff"/>
-                  </a:solidFill>
-                </a:uFill>
-                <a:latin typeface="Arial"/>
-                <a:ea typeface="DejaVu Sans"/>
-              </a:rPr>
-              <a:t>DEADLINE </a:t>
-            </a:r>
-            <a:r>
-              <a:rPr b="1" lang="en-GB" sz="2400" spc="-1" strike="noStrike" u="sng">
-                <a:solidFill>
-                  <a:srgbClr val="000000"/>
-                </a:solidFill>
-                <a:uFill>
-                  <a:solidFill>
-                    <a:srgbClr val="ffffff"/>
-                  </a:solidFill>
-                </a:uFill>
-                <a:latin typeface="Arial"/>
-                <a:ea typeface="DejaVu Sans"/>
-              </a:rPr>
-              <a:t>(sooner the better)</a:t>
+              <a:t> February 2018</a:t>
             </a:r>
             <a:endParaRPr b="0" lang="en-GB" sz="1800" spc="-1" strike="noStrike">
               <a:solidFill>
@@ -7910,7 +6977,7 @@
             </a:endParaRPr>
           </a:p>
           <a:p>
-            <a:pPr marL="432000" indent="-320760">
+            <a:pPr lvl="4" marL="1080000" indent="-214560">
               <a:lnSpc>
                 <a:spcPct val="100000"/>
               </a:lnSpc>
@@ -7934,6 +7001,105 @@
                 <a:latin typeface="Arial"/>
                 <a:ea typeface="DejaVu Sans"/>
               </a:rPr>
+              <a:t>28</a:t>
+            </a:r>
+            <a:r>
+              <a:rPr b="0" lang="en-GB" sz="2800" spc="-1" strike="noStrike" baseline="101000">
+                <a:solidFill>
+                  <a:srgbClr val="000000"/>
+                </a:solidFill>
+                <a:uFill>
+                  <a:solidFill>
+                    <a:srgbClr val="ffffff"/>
+                  </a:solidFill>
+                </a:uFill>
+                <a:latin typeface="Arial"/>
+                <a:ea typeface="DejaVu Sans"/>
+              </a:rPr>
+              <a:t>th</a:t>
+            </a:r>
+            <a:r>
+              <a:rPr b="0" lang="en-GB" sz="2800" spc="-1" strike="noStrike">
+                <a:solidFill>
+                  <a:srgbClr val="000000"/>
+                </a:solidFill>
+                <a:uFill>
+                  <a:solidFill>
+                    <a:srgbClr val="ffffff"/>
+                  </a:solidFill>
+                </a:uFill>
+                <a:latin typeface="Arial"/>
+                <a:ea typeface="DejaVu Sans"/>
+              </a:rPr>
+              <a:t> February 2018 – </a:t>
+            </a:r>
+            <a:r>
+              <a:rPr b="1" lang="en-GB" sz="2800" spc="-1" strike="noStrike" u="sng">
+                <a:solidFill>
+                  <a:srgbClr val="000000"/>
+                </a:solidFill>
+                <a:uFill>
+                  <a:solidFill>
+                    <a:srgbClr val="ffffff"/>
+                  </a:solidFill>
+                </a:uFill>
+                <a:latin typeface="Arial"/>
+                <a:ea typeface="DejaVu Sans"/>
+              </a:rPr>
+              <a:t>DEADLINE </a:t>
+            </a:r>
+            <a:r>
+              <a:rPr b="1" lang="en-GB" sz="2400" spc="-1" strike="noStrike" u="sng">
+                <a:solidFill>
+                  <a:srgbClr val="000000"/>
+                </a:solidFill>
+                <a:uFill>
+                  <a:solidFill>
+                    <a:srgbClr val="ffffff"/>
+                  </a:solidFill>
+                </a:uFill>
+                <a:latin typeface="Arial"/>
+                <a:ea typeface="DejaVu Sans"/>
+              </a:rPr>
+              <a:t>(sooner the better)</a:t>
+            </a:r>
+            <a:endParaRPr b="0" lang="en-GB" sz="1800" spc="-1" strike="noStrike">
+              <a:solidFill>
+                <a:srgbClr val="000000"/>
+              </a:solidFill>
+              <a:uFill>
+                <a:solidFill>
+                  <a:srgbClr val="ffffff"/>
+                </a:solidFill>
+              </a:uFill>
+              <a:latin typeface="Arial"/>
+            </a:endParaRPr>
+          </a:p>
+          <a:p>
+            <a:pPr marL="432000" indent="-320400">
+              <a:lnSpc>
+                <a:spcPct val="100000"/>
+              </a:lnSpc>
+              <a:buClr>
+                <a:srgbClr val="000000"/>
+              </a:buClr>
+              <a:buSzPct val="45000"/>
+              <a:buFont typeface="Wingdings" charset="2"/>
+              <a:buChar char=""/>
+            </a:pPr>
+            <a:r>
+              <a:rPr b="0" lang="en-GB" sz="2800" spc="-1" strike="noStrike">
+                <a:solidFill>
+                  <a:srgbClr val="000000"/>
+                </a:solidFill>
+                <a:uFill>
+                  <a:solidFill>
+                    <a:srgbClr val="ffffff"/>
+                  </a:solidFill>
+                </a:uFill>
+                <a:latin typeface="Arial"/>
+                <a:ea typeface="DejaVu Sans"/>
+              </a:rPr>
               <a:t>Phoebe will be managing the orders</a:t>
             </a:r>
             <a:endParaRPr b="0" lang="en-GB" sz="1800" spc="-1" strike="noStrike">
@@ -7949,7 +7115,7 @@
             </a:endParaRPr>
           </a:p>
           <a:p>
-            <a:pPr marL="432000" indent="-320760">
+            <a:pPr marL="432000" indent="-320400">
               <a:lnSpc>
                 <a:spcPct val="100000"/>
               </a:lnSpc>
@@ -8002,7 +7168,7 @@
         <p:spPr>
           <a:xfrm>
             <a:off x="0" y="0"/>
-            <a:ext cx="10076760" cy="1047240"/>
+            <a:ext cx="10076400" cy="1046880"/>
           </a:xfrm>
           <a:prstGeom prst="rect">
             <a:avLst/>
@@ -8025,7 +7191,7 @@
         <p:spPr>
           <a:xfrm>
             <a:off x="39240" y="0"/>
-            <a:ext cx="1066680" cy="1075320"/>
+            <a:ext cx="1066320" cy="1074960"/>
           </a:xfrm>
           <a:prstGeom prst="rect">
             <a:avLst/>
@@ -8044,7 +7210,7 @@
         <p:spPr>
           <a:xfrm>
             <a:off x="2448000" y="0"/>
-            <a:ext cx="7683840" cy="1061280"/>
+            <a:ext cx="7683480" cy="1060920"/>
           </a:xfrm>
           <a:prstGeom prst="rect">
             <a:avLst/>
@@ -8102,320 +7268,10 @@
   <p:timing>
     <p:tnLst>
       <p:par>
-        <p:cTn id="69" dur="indefinite" restart="never" nodeType="tmRoot">
+        <p:cTn id="11" dur="indefinite" restart="never" nodeType="tmRoot">
           <p:childTnLst>
             <p:seq>
-              <p:cTn id="70" nodeType="mainSeq">
-                <p:childTnLst>
-                  <p:par>
-                    <p:cTn id="71" fill="freeze">
-                      <p:stCondLst>
-                        <p:cond delay="indefinite"/>
-                      </p:stCondLst>
-                      <p:childTnLst>
-                        <p:par>
-                          <p:cTn id="72" fill="freeze">
-                            <p:stCondLst>
-                              <p:cond delay="0"/>
-                            </p:stCondLst>
-                            <p:childTnLst>
-                              <p:par>
-                                <p:cTn id="73" nodeType="clickEffect" fill="hold" presetClass="entr" presetID="1">
-                                  <p:stCondLst>
-                                    <p:cond delay="0"/>
-                                  </p:stCondLst>
-                                  <p:childTnLst>
-                                    <p:set>
-                                      <p:cBhvr>
-                                        <p:cTn id="74" dur="1" fill="hold">
-                                          <p:stCondLst>
-                                            <p:cond delay="0"/>
-                                          </p:stCondLst>
-                                        </p:cTn>
-                                        <p:tgtEl>
-                                          <p:spTgt spid="98">
-                                            <p:txEl>
-                                              <p:pRg st="0" end="61"/>
-                                            </p:txEl>
-                                          </p:spTgt>
-                                        </p:tgtEl>
-                                        <p:attrNameLst>
-                                          <p:attrName>style.visibility</p:attrName>
-                                        </p:attrNameLst>
-                                      </p:cBhvr>
-                                      <p:to>
-                                        <p:strVal val="visible"/>
-                                      </p:to>
-                                    </p:set>
-                                  </p:childTnLst>
-                                </p:cTn>
-                              </p:par>
-                            </p:childTnLst>
-                          </p:cTn>
-                        </p:par>
-                      </p:childTnLst>
-                    </p:cTn>
-                  </p:par>
-                  <p:par>
-                    <p:cTn id="75" fill="freeze">
-                      <p:stCondLst>
-                        <p:cond delay="indefinite"/>
-                      </p:stCondLst>
-                      <p:childTnLst>
-                        <p:par>
-                          <p:cTn id="76" fill="freeze">
-                            <p:stCondLst>
-                              <p:cond delay="0"/>
-                            </p:stCondLst>
-                            <p:childTnLst>
-                              <p:par>
-                                <p:cTn id="77" nodeType="clickEffect" fill="hold" presetClass="entr" presetID="1">
-                                  <p:stCondLst>
-                                    <p:cond delay="0"/>
-                                  </p:stCondLst>
-                                  <p:childTnLst>
-                                    <p:set>
-                                      <p:cBhvr>
-                                        <p:cTn id="78" dur="1" fill="hold">
-                                          <p:stCondLst>
-                                            <p:cond delay="0"/>
-                                          </p:stCondLst>
-                                        </p:cTn>
-                                        <p:tgtEl>
-                                          <p:spTgt spid="98">
-                                            <p:txEl>
-                                              <p:pRg st="61" end="108"/>
-                                            </p:txEl>
-                                          </p:spTgt>
-                                        </p:tgtEl>
-                                        <p:attrNameLst>
-                                          <p:attrName>style.visibility</p:attrName>
-                                        </p:attrNameLst>
-                                      </p:cBhvr>
-                                      <p:to>
-                                        <p:strVal val="visible"/>
-                                      </p:to>
-                                    </p:set>
-                                  </p:childTnLst>
-                                </p:cTn>
-                              </p:par>
-                            </p:childTnLst>
-                          </p:cTn>
-                        </p:par>
-                      </p:childTnLst>
-                    </p:cTn>
-                  </p:par>
-                  <p:par>
-                    <p:cTn id="79" fill="freeze">
-                      <p:stCondLst>
-                        <p:cond delay="indefinite"/>
-                      </p:stCondLst>
-                      <p:childTnLst>
-                        <p:par>
-                          <p:cTn id="80" fill="freeze">
-                            <p:stCondLst>
-                              <p:cond delay="0"/>
-                            </p:stCondLst>
-                            <p:childTnLst>
-                              <p:par>
-                                <p:cTn id="81" nodeType="clickEffect" fill="hold" presetClass="entr" presetID="1">
-                                  <p:stCondLst>
-                                    <p:cond delay="0"/>
-                                  </p:stCondLst>
-                                  <p:childTnLst>
-                                    <p:set>
-                                      <p:cBhvr>
-                                        <p:cTn id="82" dur="1" fill="hold">
-                                          <p:stCondLst>
-                                            <p:cond delay="0"/>
-                                          </p:stCondLst>
-                                        </p:cTn>
-                                        <p:tgtEl>
-                                          <p:spTgt spid="98">
-                                            <p:txEl>
-                                              <p:pRg st="108" end="127"/>
-                                            </p:txEl>
-                                          </p:spTgt>
-                                        </p:tgtEl>
-                                        <p:attrNameLst>
-                                          <p:attrName>style.visibility</p:attrName>
-                                        </p:attrNameLst>
-                                      </p:cBhvr>
-                                      <p:to>
-                                        <p:strVal val="visible"/>
-                                      </p:to>
-                                    </p:set>
-                                  </p:childTnLst>
-                                </p:cTn>
-                              </p:par>
-                              <p:par>
-                                <p:cTn id="83" nodeType="withEffect" fill="hold" presetClass="entr" presetID="1">
-                                  <p:stCondLst>
-                                    <p:cond delay="0"/>
-                                  </p:stCondLst>
-                                  <p:childTnLst>
-                                    <p:set>
-                                      <p:cBhvr>
-                                        <p:cTn id="84" dur="1" fill="hold">
-                                          <p:stCondLst>
-                                            <p:cond delay="0"/>
-                                          </p:stCondLst>
-                                        </p:cTn>
-                                        <p:tgtEl>
-                                          <p:spTgt spid="98">
-                                            <p:txEl>
-                                              <p:pRg st="127" end="146"/>
-                                            </p:txEl>
-                                          </p:spTgt>
-                                        </p:tgtEl>
-                                        <p:attrNameLst>
-                                          <p:attrName>style.visibility</p:attrName>
-                                        </p:attrNameLst>
-                                      </p:cBhvr>
-                                      <p:to>
-                                        <p:strVal val="visible"/>
-                                      </p:to>
-                                    </p:set>
-                                  </p:childTnLst>
-                                </p:cTn>
-                              </p:par>
-                              <p:par>
-                                <p:cTn id="85" nodeType="withEffect" fill="hold" presetClass="entr" presetID="1">
-                                  <p:stCondLst>
-                                    <p:cond delay="0"/>
-                                  </p:stCondLst>
-                                  <p:childTnLst>
-                                    <p:set>
-                                      <p:cBhvr>
-                                        <p:cTn id="86" dur="1" fill="hold">
-                                          <p:stCondLst>
-                                            <p:cond delay="0"/>
-                                          </p:stCondLst>
-                                        </p:cTn>
-                                        <p:tgtEl>
-                                          <p:spTgt spid="98">
-                                            <p:txEl>
-                                              <p:pRg st="146" end="196"/>
-                                            </p:txEl>
-                                          </p:spTgt>
-                                        </p:tgtEl>
-                                        <p:attrNameLst>
-                                          <p:attrName>style.visibility</p:attrName>
-                                        </p:attrNameLst>
-                                      </p:cBhvr>
-                                      <p:to>
-                                        <p:strVal val="visible"/>
-                                      </p:to>
-                                    </p:set>
-                                  </p:childTnLst>
-                                </p:cTn>
-                              </p:par>
-                            </p:childTnLst>
-                          </p:cTn>
-                        </p:par>
-                      </p:childTnLst>
-                    </p:cTn>
-                  </p:par>
-                  <p:par>
-                    <p:cTn id="87" fill="freeze">
-                      <p:stCondLst>
-                        <p:cond delay="indefinite"/>
-                      </p:stCondLst>
-                      <p:childTnLst>
-                        <p:par>
-                          <p:cTn id="88" fill="freeze">
-                            <p:stCondLst>
-                              <p:cond delay="0"/>
-                            </p:stCondLst>
-                            <p:childTnLst>
-                              <p:par>
-                                <p:cTn id="89" nodeType="clickEffect" fill="hold" presetClass="entr" presetID="1">
-                                  <p:stCondLst>
-                                    <p:cond delay="0"/>
-                                  </p:stCondLst>
-                                  <p:childTnLst>
-                                    <p:set>
-                                      <p:cBhvr>
-                                        <p:cTn id="90" dur="1" fill="hold">
-                                          <p:stCondLst>
-                                            <p:cond delay="0"/>
-                                          </p:stCondLst>
-                                        </p:cTn>
-                                        <p:tgtEl>
-                                          <p:spTgt spid="98">
-                                            <p:txEl>
-                                              <p:pRg st="196" end="231"/>
-                                            </p:txEl>
-                                          </p:spTgt>
-                                        </p:tgtEl>
-                                        <p:attrNameLst>
-                                          <p:attrName>style.visibility</p:attrName>
-                                        </p:attrNameLst>
-                                      </p:cBhvr>
-                                      <p:to>
-                                        <p:strVal val="visible"/>
-                                      </p:to>
-                                    </p:set>
-                                  </p:childTnLst>
-                                </p:cTn>
-                              </p:par>
-                            </p:childTnLst>
-                          </p:cTn>
-                        </p:par>
-                      </p:childTnLst>
-                    </p:cTn>
-                  </p:par>
-                  <p:par>
-                    <p:cTn id="91" fill="freeze">
-                      <p:stCondLst>
-                        <p:cond delay="indefinite"/>
-                      </p:stCondLst>
-                      <p:childTnLst>
-                        <p:par>
-                          <p:cTn id="92" fill="freeze">
-                            <p:stCondLst>
-                              <p:cond delay="0"/>
-                            </p:stCondLst>
-                            <p:childTnLst>
-                              <p:par>
-                                <p:cTn id="93" nodeType="clickEffect" fill="hold" presetClass="entr" presetID="1">
-                                  <p:stCondLst>
-                                    <p:cond delay="0"/>
-                                  </p:stCondLst>
-                                  <p:childTnLst>
-                                    <p:set>
-                                      <p:cBhvr>
-                                        <p:cTn id="94" dur="1" fill="hold">
-                                          <p:stCondLst>
-                                            <p:cond delay="0"/>
-                                          </p:stCondLst>
-                                        </p:cTn>
-                                        <p:tgtEl>
-                                          <p:spTgt spid="98">
-                                            <p:txEl>
-                                              <p:pRg st="231" end="293"/>
-                                            </p:txEl>
-                                          </p:spTgt>
-                                        </p:tgtEl>
-                                        <p:attrNameLst>
-                                          <p:attrName>style.visibility</p:attrName>
-                                        </p:attrNameLst>
-                                      </p:cBhvr>
-                                      <p:to>
-                                        <p:strVal val="visible"/>
-                                      </p:to>
-                                    </p:set>
-                                  </p:childTnLst>
-                                </p:cTn>
-                              </p:par>
-                            </p:childTnLst>
-                          </p:cTn>
-                        </p:par>
-                      </p:childTnLst>
-                    </p:cTn>
-                  </p:par>
-                </p:childTnLst>
-              </p:cTn>
+              <p:cTn id="12" nodeType="mainSeq"/>
               <p:prevCondLst>
                 <p:cond delay="0" evt="onPrev">
                   <p:tgtEl>
@@ -8465,7 +7321,7 @@
         <p:spPr>
           <a:xfrm>
             <a:off x="504000" y="1467720"/>
-            <a:ext cx="9068400" cy="1258920"/>
+            <a:ext cx="9068040" cy="1258560"/>
           </a:xfrm>
           <a:prstGeom prst="rect">
             <a:avLst/>
@@ -8527,7 +7383,7 @@
         <p:spPr>
           <a:xfrm>
             <a:off x="504000" y="2728440"/>
-            <a:ext cx="9068400" cy="4381200"/>
+            <a:ext cx="9068040" cy="4380840"/>
           </a:xfrm>
           <a:prstGeom prst="rect">
             <a:avLst/>
@@ -8546,7 +7402,7 @@
         <p:txBody>
           <a:bodyPr lIns="0" rIns="0" tIns="0" bIns="0"/>
           <a:p>
-            <a:pPr marL="432000" indent="-320760">
+            <a:pPr marL="432000" indent="-320400">
               <a:lnSpc>
                 <a:spcPct val="100000"/>
               </a:lnSpc>
@@ -8585,7 +7441,7 @@
             </a:endParaRPr>
           </a:p>
           <a:p>
-            <a:pPr marL="432000" indent="-320760">
+            <a:pPr marL="432000" indent="-320400">
               <a:lnSpc>
                 <a:spcPct val="100000"/>
               </a:lnSpc>
@@ -8654,7 +7510,7 @@
             </a:endParaRPr>
           </a:p>
           <a:p>
-            <a:pPr marL="432000" indent="-320760">
+            <a:pPr marL="432000" indent="-320400">
               <a:lnSpc>
                 <a:spcPct val="100000"/>
               </a:lnSpc>
@@ -8693,7 +7549,7 @@
             </a:endParaRPr>
           </a:p>
           <a:p>
-            <a:pPr marL="432000" indent="-320760">
+            <a:pPr marL="432000" indent="-320400">
               <a:lnSpc>
                 <a:spcPct val="100000"/>
               </a:lnSpc>
@@ -8732,7 +7588,7 @@
             </a:endParaRPr>
           </a:p>
           <a:p>
-            <a:pPr marL="432000" indent="-320760" algn="ctr">
+            <a:pPr marL="432000" indent="-320400" algn="ctr">
               <a:lnSpc>
                 <a:spcPct val="100000"/>
               </a:lnSpc>
@@ -8771,7 +7627,7 @@
             </a:endParaRPr>
           </a:p>
           <a:p>
-            <a:pPr marL="432000" indent="-320760" algn="ctr">
+            <a:pPr marL="432000" indent="-320400" algn="ctr">
               <a:lnSpc>
                 <a:spcPct val="100000"/>
               </a:lnSpc>
@@ -8840,7 +7696,7 @@
         <p:spPr>
           <a:xfrm>
             <a:off x="0" y="0"/>
-            <a:ext cx="10076760" cy="1047240"/>
+            <a:ext cx="10076400" cy="1046880"/>
           </a:xfrm>
           <a:prstGeom prst="rect">
             <a:avLst/>
@@ -8863,7 +7719,7 @@
         <p:spPr>
           <a:xfrm>
             <a:off x="39240" y="0"/>
-            <a:ext cx="1066680" cy="1075320"/>
+            <a:ext cx="1066320" cy="1074960"/>
           </a:xfrm>
           <a:prstGeom prst="rect">
             <a:avLst/>
@@ -8882,7 +7738,7 @@
         <p:spPr>
           <a:xfrm>
             <a:off x="2448000" y="0"/>
-            <a:ext cx="7683840" cy="1061280"/>
+            <a:ext cx="7683480" cy="1060920"/>
           </a:xfrm>
           <a:prstGeom prst="rect">
             <a:avLst/>
@@ -8940,289 +7796,10 @@
   <p:timing>
     <p:tnLst>
       <p:par>
-        <p:cTn id="95" dur="indefinite" restart="never" nodeType="tmRoot">
+        <p:cTn id="13" dur="indefinite" restart="never" nodeType="tmRoot">
           <p:childTnLst>
             <p:seq>
-              <p:cTn id="96" nodeType="mainSeq">
-                <p:childTnLst>
-                  <p:par>
-                    <p:cTn id="97" fill="freeze">
-                      <p:stCondLst>
-                        <p:cond delay="indefinite"/>
-                      </p:stCondLst>
-                      <p:childTnLst>
-                        <p:par>
-                          <p:cTn id="98" fill="freeze">
-                            <p:stCondLst>
-                              <p:cond delay="0"/>
-                            </p:stCondLst>
-                            <p:childTnLst>
-                              <p:par>
-                                <p:cTn id="99" nodeType="clickEffect" fill="hold" presetClass="entr" presetID="1">
-                                  <p:stCondLst>
-                                    <p:cond delay="0"/>
-                                  </p:stCondLst>
-                                  <p:childTnLst>
-                                    <p:set>
-                                      <p:cBhvr>
-                                        <p:cTn id="100" dur="1" fill="hold">
-                                          <p:stCondLst>
-                                            <p:cond delay="0"/>
-                                          </p:stCondLst>
-                                        </p:cTn>
-                                        <p:tgtEl>
-                                          <p:spTgt spid="103">
-                                            <p:txEl>
-                                              <p:pRg st="0" end="23"/>
-                                            </p:txEl>
-                                          </p:spTgt>
-                                        </p:tgtEl>
-                                        <p:attrNameLst>
-                                          <p:attrName>style.visibility</p:attrName>
-                                        </p:attrNameLst>
-                                      </p:cBhvr>
-                                      <p:to>
-                                        <p:strVal val="visible"/>
-                                      </p:to>
-                                    </p:set>
-                                  </p:childTnLst>
-                                </p:cTn>
-                              </p:par>
-                            </p:childTnLst>
-                          </p:cTn>
-                        </p:par>
-                      </p:childTnLst>
-                    </p:cTn>
-                  </p:par>
-                  <p:par>
-                    <p:cTn id="101" fill="freeze">
-                      <p:stCondLst>
-                        <p:cond delay="indefinite"/>
-                      </p:stCondLst>
-                      <p:childTnLst>
-                        <p:par>
-                          <p:cTn id="102" fill="freeze">
-                            <p:stCondLst>
-                              <p:cond delay="0"/>
-                            </p:stCondLst>
-                            <p:childTnLst>
-                              <p:par>
-                                <p:cTn id="103" nodeType="clickEffect" fill="hold" presetClass="entr" presetID="1">
-                                  <p:stCondLst>
-                                    <p:cond delay="0"/>
-                                  </p:stCondLst>
-                                  <p:childTnLst>
-                                    <p:set>
-                                      <p:cBhvr>
-                                        <p:cTn id="104" dur="1" fill="hold">
-                                          <p:stCondLst>
-                                            <p:cond delay="0"/>
-                                          </p:stCondLst>
-                                        </p:cTn>
-                                        <p:tgtEl>
-                                          <p:spTgt spid="103">
-                                            <p:txEl>
-                                              <p:pRg st="23" end="42"/>
-                                            </p:txEl>
-                                          </p:spTgt>
-                                        </p:tgtEl>
-                                        <p:attrNameLst>
-                                          <p:attrName>style.visibility</p:attrName>
-                                        </p:attrNameLst>
-                                      </p:cBhvr>
-                                      <p:to>
-                                        <p:strVal val="visible"/>
-                                      </p:to>
-                                    </p:set>
-                                  </p:childTnLst>
-                                </p:cTn>
-                              </p:par>
-                            </p:childTnLst>
-                          </p:cTn>
-                        </p:par>
-                      </p:childTnLst>
-                    </p:cTn>
-                  </p:par>
-                  <p:par>
-                    <p:cTn id="105" fill="freeze">
-                      <p:stCondLst>
-                        <p:cond delay="indefinite"/>
-                      </p:stCondLst>
-                      <p:childTnLst>
-                        <p:par>
-                          <p:cTn id="106" fill="freeze">
-                            <p:stCondLst>
-                              <p:cond delay="0"/>
-                            </p:stCondLst>
-                            <p:childTnLst>
-                              <p:par>
-                                <p:cTn id="107" nodeType="clickEffect" fill="hold" presetClass="entr" presetID="1">
-                                  <p:stCondLst>
-                                    <p:cond delay="0"/>
-                                  </p:stCondLst>
-                                  <p:childTnLst>
-                                    <p:set>
-                                      <p:cBhvr>
-                                        <p:cTn id="108" dur="1" fill="hold">
-                                          <p:stCondLst>
-                                            <p:cond delay="0"/>
-                                          </p:stCondLst>
-                                        </p:cTn>
-                                        <p:tgtEl>
-                                          <p:spTgt spid="103">
-                                            <p:txEl>
-                                              <p:pRg st="42" end="73"/>
-                                            </p:txEl>
-                                          </p:spTgt>
-                                        </p:tgtEl>
-                                        <p:attrNameLst>
-                                          <p:attrName>style.visibility</p:attrName>
-                                        </p:attrNameLst>
-                                      </p:cBhvr>
-                                      <p:to>
-                                        <p:strVal val="visible"/>
-                                      </p:to>
-                                    </p:set>
-                                  </p:childTnLst>
-                                </p:cTn>
-                              </p:par>
-                            </p:childTnLst>
-                          </p:cTn>
-                        </p:par>
-                      </p:childTnLst>
-                    </p:cTn>
-                  </p:par>
-                  <p:par>
-                    <p:cTn id="109" fill="freeze">
-                      <p:stCondLst>
-                        <p:cond delay="indefinite"/>
-                      </p:stCondLst>
-                      <p:childTnLst>
-                        <p:par>
-                          <p:cTn id="110" fill="freeze">
-                            <p:stCondLst>
-                              <p:cond delay="0"/>
-                            </p:stCondLst>
-                            <p:childTnLst>
-                              <p:par>
-                                <p:cTn id="111" nodeType="clickEffect" fill="hold" presetClass="entr" presetID="1">
-                                  <p:stCondLst>
-                                    <p:cond delay="0"/>
-                                  </p:stCondLst>
-                                  <p:childTnLst>
-                                    <p:set>
-                                      <p:cBhvr>
-                                        <p:cTn id="112" dur="1" fill="hold">
-                                          <p:stCondLst>
-                                            <p:cond delay="0"/>
-                                          </p:stCondLst>
-                                        </p:cTn>
-                                        <p:tgtEl>
-                                          <p:spTgt spid="103">
-                                            <p:txEl>
-                                              <p:pRg st="73" end="115"/>
-                                            </p:txEl>
-                                          </p:spTgt>
-                                        </p:tgtEl>
-                                        <p:attrNameLst>
-                                          <p:attrName>style.visibility</p:attrName>
-                                        </p:attrNameLst>
-                                      </p:cBhvr>
-                                      <p:to>
-                                        <p:strVal val="visible"/>
-                                      </p:to>
-                                    </p:set>
-                                  </p:childTnLst>
-                                </p:cTn>
-                              </p:par>
-                            </p:childTnLst>
-                          </p:cTn>
-                        </p:par>
-                      </p:childTnLst>
-                    </p:cTn>
-                  </p:par>
-                  <p:par>
-                    <p:cTn id="113" fill="freeze">
-                      <p:stCondLst>
-                        <p:cond delay="indefinite"/>
-                      </p:stCondLst>
-                      <p:childTnLst>
-                        <p:par>
-                          <p:cTn id="114" fill="freeze">
-                            <p:stCondLst>
-                              <p:cond delay="0"/>
-                            </p:stCondLst>
-                            <p:childTnLst>
-                              <p:par>
-                                <p:cTn id="115" nodeType="clickEffect" fill="hold" presetClass="entr" presetID="1">
-                                  <p:stCondLst>
-                                    <p:cond delay="0"/>
-                                  </p:stCondLst>
-                                  <p:childTnLst>
-                                    <p:set>
-                                      <p:cBhvr>
-                                        <p:cTn id="116" dur="1" fill="hold">
-                                          <p:stCondLst>
-                                            <p:cond delay="0"/>
-                                          </p:stCondLst>
-                                        </p:cTn>
-                                        <p:tgtEl>
-                                          <p:spTgt spid="103">
-                                            <p:txEl>
-                                              <p:pRg st="115" end="128"/>
-                                            </p:txEl>
-                                          </p:spTgt>
-                                        </p:tgtEl>
-                                        <p:attrNameLst>
-                                          <p:attrName>style.visibility</p:attrName>
-                                        </p:attrNameLst>
-                                      </p:cBhvr>
-                                      <p:to>
-                                        <p:strVal val="visible"/>
-                                      </p:to>
-                                    </p:set>
-                                  </p:childTnLst>
-                                </p:cTn>
-                              </p:par>
-                              <p:par>
-                                <p:cTn id="117" nodeType="withEffect" fill="hold" presetClass="entr" presetID="1">
-                                  <p:stCondLst>
-                                    <p:cond delay="0"/>
-                                  </p:stCondLst>
-                                  <p:childTnLst>
-                                    <p:set>
-                                      <p:cBhvr>
-                                        <p:cTn id="118" dur="1" fill="hold">
-                                          <p:stCondLst>
-                                            <p:cond delay="0"/>
-                                          </p:stCondLst>
-                                        </p:cTn>
-                                        <p:tgtEl>
-                                          <p:spTgt spid="103">
-                                            <p:txEl>
-                                              <p:pRg st="128" end="173"/>
-                                            </p:txEl>
-                                          </p:spTgt>
-                                        </p:tgtEl>
-                                        <p:attrNameLst>
-                                          <p:attrName>style.visibility</p:attrName>
-                                        </p:attrNameLst>
-                                      </p:cBhvr>
-                                      <p:to>
-                                        <p:strVal val="visible"/>
-                                      </p:to>
-                                    </p:set>
-                                  </p:childTnLst>
-                                </p:cTn>
-                              </p:par>
-                            </p:childTnLst>
-                          </p:cTn>
-                        </p:par>
-                      </p:childTnLst>
-                    </p:cTn>
-                  </p:par>
-                </p:childTnLst>
-              </p:cTn>
+              <p:cTn id="14" nodeType="mainSeq"/>
               <p:prevCondLst>
                 <p:cond delay="0" evt="onPrev">
                   <p:tgtEl>
@@ -9272,7 +7849,7 @@
         <p:spPr>
           <a:xfrm>
             <a:off x="504000" y="1467720"/>
-            <a:ext cx="9068400" cy="1258920"/>
+            <a:ext cx="9068040" cy="1258560"/>
           </a:xfrm>
           <a:prstGeom prst="rect">
             <a:avLst/>
@@ -9382,7 +7959,7 @@
         <p:spPr>
           <a:xfrm>
             <a:off x="504000" y="2728440"/>
-            <a:ext cx="9068400" cy="4381200"/>
+            <a:ext cx="9068040" cy="4380840"/>
           </a:xfrm>
           <a:prstGeom prst="rect">
             <a:avLst/>
@@ -9401,7 +7978,7 @@
         <p:txBody>
           <a:bodyPr lIns="0" rIns="0" tIns="0" bIns="0"/>
           <a:p>
-            <a:pPr marL="432000" indent="-320760">
+            <a:pPr marL="432000" indent="-320400">
               <a:lnSpc>
                 <a:spcPct val="100000"/>
               </a:lnSpc>
@@ -9545,7 +8122,7 @@
             </a:endParaRPr>
           </a:p>
           <a:p>
-            <a:pPr marL="432000" indent="-320760">
+            <a:pPr marL="432000" indent="-320400">
               <a:lnSpc>
                 <a:spcPct val="100000"/>
               </a:lnSpc>
@@ -9599,7 +8176,7 @@
             </a:endParaRPr>
           </a:p>
           <a:p>
-            <a:pPr marL="432000" indent="-320760">
+            <a:pPr marL="432000" indent="-320400">
               <a:lnSpc>
                 <a:spcPct val="100000"/>
               </a:lnSpc>
@@ -9668,7 +8245,7 @@
             </a:endParaRPr>
           </a:p>
           <a:p>
-            <a:pPr marL="432000" indent="-320760">
+            <a:pPr marL="432000" indent="-320400">
               <a:lnSpc>
                 <a:spcPct val="100000"/>
               </a:lnSpc>
@@ -9722,7 +8299,7 @@
             </a:endParaRPr>
           </a:p>
           <a:p>
-            <a:pPr marL="432000" indent="-320760">
+            <a:pPr marL="432000" indent="-320400">
               <a:lnSpc>
                 <a:spcPct val="100000"/>
               </a:lnSpc>
@@ -9761,7 +8338,7 @@
             </a:endParaRPr>
           </a:p>
           <a:p>
-            <a:pPr lvl="3" marL="864000" indent="-215640">
+            <a:pPr lvl="3" marL="864000" indent="-215280">
               <a:lnSpc>
                 <a:spcPct val="100000"/>
               </a:lnSpc>
@@ -9800,7 +8377,7 @@
             </a:endParaRPr>
           </a:p>
           <a:p>
-            <a:pPr lvl="3" marL="864000" indent="-215640">
+            <a:pPr lvl="3" marL="864000" indent="-215280">
               <a:lnSpc>
                 <a:spcPct val="100000"/>
               </a:lnSpc>
@@ -9839,7 +8416,7 @@
             </a:endParaRPr>
           </a:p>
           <a:p>
-            <a:pPr marL="432000" indent="-320760">
+            <a:pPr marL="432000" indent="-320400">
               <a:lnSpc>
                 <a:spcPct val="100000"/>
               </a:lnSpc>
@@ -9892,7 +8469,7 @@
         <p:spPr>
           <a:xfrm>
             <a:off x="0" y="0"/>
-            <a:ext cx="10076760" cy="1047240"/>
+            <a:ext cx="10076400" cy="1046880"/>
           </a:xfrm>
           <a:prstGeom prst="rect">
             <a:avLst/>
@@ -9915,7 +8492,7 @@
         <p:spPr>
           <a:xfrm>
             <a:off x="39240" y="0"/>
-            <a:ext cx="1066680" cy="1075320"/>
+            <a:ext cx="1066320" cy="1074960"/>
           </a:xfrm>
           <a:prstGeom prst="rect">
             <a:avLst/>
@@ -9934,7 +8511,7 @@
         <p:spPr>
           <a:xfrm>
             <a:off x="2448000" y="0"/>
-            <a:ext cx="7683840" cy="1061280"/>
+            <a:ext cx="7683480" cy="1060920"/>
           </a:xfrm>
           <a:prstGeom prst="rect">
             <a:avLst/>
@@ -9992,387 +8569,10 @@
   <p:timing>
     <p:tnLst>
       <p:par>
-        <p:cTn id="119" dur="indefinite" restart="never" nodeType="tmRoot">
+        <p:cTn id="15" dur="indefinite" restart="never" nodeType="tmRoot">
           <p:childTnLst>
             <p:seq>
-              <p:cTn id="120" nodeType="mainSeq">
-                <p:childTnLst>
-                  <p:par>
-                    <p:cTn id="121" fill="freeze">
-                      <p:stCondLst>
-                        <p:cond delay="indefinite"/>
-                      </p:stCondLst>
-                      <p:childTnLst>
-                        <p:par>
-                          <p:cTn id="122" fill="freeze">
-                            <p:stCondLst>
-                              <p:cond delay="0"/>
-                            </p:stCondLst>
-                            <p:childTnLst>
-                              <p:par>
-                                <p:cTn id="123" nodeType="clickEffect" fill="hold" presetClass="entr" presetID="1">
-                                  <p:stCondLst>
-                                    <p:cond delay="0"/>
-                                  </p:stCondLst>
-                                  <p:childTnLst>
-                                    <p:set>
-                                      <p:cBhvr>
-                                        <p:cTn id="124" dur="1" fill="hold">
-                                          <p:stCondLst>
-                                            <p:cond delay="0"/>
-                                          </p:stCondLst>
-                                        </p:cTn>
-                                        <p:tgtEl>
-                                          <p:spTgt spid="108">
-                                            <p:txEl>
-                                              <p:pRg st="0" end="34"/>
-                                            </p:txEl>
-                                          </p:spTgt>
-                                        </p:tgtEl>
-                                        <p:attrNameLst>
-                                          <p:attrName>style.visibility</p:attrName>
-                                        </p:attrNameLst>
-                                      </p:cBhvr>
-                                      <p:to>
-                                        <p:strVal val="visible"/>
-                                      </p:to>
-                                    </p:set>
-                                  </p:childTnLst>
-                                </p:cTn>
-                              </p:par>
-                            </p:childTnLst>
-                          </p:cTn>
-                        </p:par>
-                      </p:childTnLst>
-                    </p:cTn>
-                  </p:par>
-                  <p:par>
-                    <p:cTn id="125" fill="freeze">
-                      <p:stCondLst>
-                        <p:cond delay="indefinite"/>
-                      </p:stCondLst>
-                      <p:childTnLst>
-                        <p:par>
-                          <p:cTn id="126" fill="freeze">
-                            <p:stCondLst>
-                              <p:cond delay="0"/>
-                            </p:stCondLst>
-                            <p:childTnLst>
-                              <p:par>
-                                <p:cTn id="127" nodeType="clickEffect" fill="hold" presetClass="entr" presetID="1">
-                                  <p:stCondLst>
-                                    <p:cond delay="0"/>
-                                  </p:stCondLst>
-                                  <p:childTnLst>
-                                    <p:set>
-                                      <p:cBhvr>
-                                        <p:cTn id="128" dur="1" fill="hold">
-                                          <p:stCondLst>
-                                            <p:cond delay="0"/>
-                                          </p:stCondLst>
-                                        </p:cTn>
-                                        <p:tgtEl>
-                                          <p:spTgt spid="108">
-                                            <p:txEl>
-                                              <p:pRg st="34" end="57"/>
-                                            </p:txEl>
-                                          </p:spTgt>
-                                        </p:tgtEl>
-                                        <p:attrNameLst>
-                                          <p:attrName>style.visibility</p:attrName>
-                                        </p:attrNameLst>
-                                      </p:cBhvr>
-                                      <p:to>
-                                        <p:strVal val="visible"/>
-                                      </p:to>
-                                    </p:set>
-                                  </p:childTnLst>
-                                </p:cTn>
-                              </p:par>
-                            </p:childTnLst>
-                          </p:cTn>
-                        </p:par>
-                      </p:childTnLst>
-                    </p:cTn>
-                  </p:par>
-                  <p:par>
-                    <p:cTn id="129" fill="freeze">
-                      <p:stCondLst>
-                        <p:cond delay="indefinite"/>
-                      </p:stCondLst>
-                      <p:childTnLst>
-                        <p:par>
-                          <p:cTn id="130" fill="freeze">
-                            <p:stCondLst>
-                              <p:cond delay="0"/>
-                            </p:stCondLst>
-                            <p:childTnLst>
-                              <p:par>
-                                <p:cTn id="131" nodeType="clickEffect" fill="hold" presetClass="entr" presetID="1">
-                                  <p:stCondLst>
-                                    <p:cond delay="0"/>
-                                  </p:stCondLst>
-                                  <p:childTnLst>
-                                    <p:set>
-                                      <p:cBhvr>
-                                        <p:cTn id="132" dur="1" fill="hold">
-                                          <p:stCondLst>
-                                            <p:cond delay="0"/>
-                                          </p:stCondLst>
-                                        </p:cTn>
-                                        <p:tgtEl>
-                                          <p:spTgt spid="108">
-                                            <p:txEl>
-                                              <p:pRg st="57" end="100"/>
-                                            </p:txEl>
-                                          </p:spTgt>
-                                        </p:tgtEl>
-                                        <p:attrNameLst>
-                                          <p:attrName>style.visibility</p:attrName>
-                                        </p:attrNameLst>
-                                      </p:cBhvr>
-                                      <p:to>
-                                        <p:strVal val="visible"/>
-                                      </p:to>
-                                    </p:set>
-                                  </p:childTnLst>
-                                </p:cTn>
-                              </p:par>
-                            </p:childTnLst>
-                          </p:cTn>
-                        </p:par>
-                      </p:childTnLst>
-                    </p:cTn>
-                  </p:par>
-                  <p:par>
-                    <p:cTn id="133" fill="freeze">
-                      <p:stCondLst>
-                        <p:cond delay="indefinite"/>
-                      </p:stCondLst>
-                      <p:childTnLst>
-                        <p:par>
-                          <p:cTn id="134" fill="freeze">
-                            <p:stCondLst>
-                              <p:cond delay="0"/>
-                            </p:stCondLst>
-                            <p:childTnLst>
-                              <p:par>
-                                <p:cTn id="135" nodeType="clickEffect" fill="hold" presetClass="entr" presetID="1">
-                                  <p:stCondLst>
-                                    <p:cond delay="0"/>
-                                  </p:stCondLst>
-                                  <p:childTnLst>
-                                    <p:set>
-                                      <p:cBhvr>
-                                        <p:cTn id="136" dur="1" fill="hold">
-                                          <p:stCondLst>
-                                            <p:cond delay="0"/>
-                                          </p:stCondLst>
-                                        </p:cTn>
-                                        <p:tgtEl>
-                                          <p:spTgt spid="108">
-                                            <p:txEl>
-                                              <p:pRg st="100" end="149"/>
-                                            </p:txEl>
-                                          </p:spTgt>
-                                        </p:tgtEl>
-                                        <p:attrNameLst>
-                                          <p:attrName>style.visibility</p:attrName>
-                                        </p:attrNameLst>
-                                      </p:cBhvr>
-                                      <p:to>
-                                        <p:strVal val="visible"/>
-                                      </p:to>
-                                    </p:set>
-                                  </p:childTnLst>
-                                </p:cTn>
-                              </p:par>
-                            </p:childTnLst>
-                          </p:cTn>
-                        </p:par>
-                      </p:childTnLst>
-                    </p:cTn>
-                  </p:par>
-                  <p:par>
-                    <p:cTn id="137" fill="freeze">
-                      <p:stCondLst>
-                        <p:cond delay="indefinite"/>
-                      </p:stCondLst>
-                      <p:childTnLst>
-                        <p:par>
-                          <p:cTn id="138" fill="freeze">
-                            <p:stCondLst>
-                              <p:cond delay="0"/>
-                            </p:stCondLst>
-                            <p:childTnLst>
-                              <p:par>
-                                <p:cTn id="139" nodeType="clickEffect" fill="hold" presetClass="entr" presetID="1">
-                                  <p:stCondLst>
-                                    <p:cond delay="0"/>
-                                  </p:stCondLst>
-                                  <p:childTnLst>
-                                    <p:set>
-                                      <p:cBhvr>
-                                        <p:cTn id="140" dur="1" fill="hold">
-                                          <p:stCondLst>
-                                            <p:cond delay="0"/>
-                                          </p:stCondLst>
-                                        </p:cTn>
-                                        <p:tgtEl>
-                                          <p:spTgt spid="108">
-                                            <p:txEl>
-                                              <p:pRg st="149" end="193"/>
-                                            </p:txEl>
-                                          </p:spTgt>
-                                        </p:tgtEl>
-                                        <p:attrNameLst>
-                                          <p:attrName>style.visibility</p:attrName>
-                                        </p:attrNameLst>
-                                      </p:cBhvr>
-                                      <p:to>
-                                        <p:strVal val="visible"/>
-                                      </p:to>
-                                    </p:set>
-                                  </p:childTnLst>
-                                </p:cTn>
-                              </p:par>
-                            </p:childTnLst>
-                          </p:cTn>
-                        </p:par>
-                      </p:childTnLst>
-                    </p:cTn>
-                  </p:par>
-                  <p:par>
-                    <p:cTn id="141" fill="freeze">
-                      <p:stCondLst>
-                        <p:cond delay="indefinite"/>
-                      </p:stCondLst>
-                      <p:childTnLst>
-                        <p:par>
-                          <p:cTn id="142" fill="freeze">
-                            <p:stCondLst>
-                              <p:cond delay="0"/>
-                            </p:stCondLst>
-                            <p:childTnLst>
-                              <p:par>
-                                <p:cTn id="143" nodeType="clickEffect" fill="hold" presetClass="entr" presetID="1">
-                                  <p:stCondLst>
-                                    <p:cond delay="0"/>
-                                  </p:stCondLst>
-                                  <p:childTnLst>
-                                    <p:set>
-                                      <p:cBhvr>
-                                        <p:cTn id="144" dur="1" fill="hold">
-                                          <p:stCondLst>
-                                            <p:cond delay="0"/>
-                                          </p:stCondLst>
-                                        </p:cTn>
-                                        <p:tgtEl>
-                                          <p:spTgt spid="108">
-                                            <p:txEl>
-                                              <p:pRg st="193" end="217"/>
-                                            </p:txEl>
-                                          </p:spTgt>
-                                        </p:tgtEl>
-                                        <p:attrNameLst>
-                                          <p:attrName>style.visibility</p:attrName>
-                                        </p:attrNameLst>
-                                      </p:cBhvr>
-                                      <p:to>
-                                        <p:strVal val="visible"/>
-                                      </p:to>
-                                    </p:set>
-                                  </p:childTnLst>
-                                </p:cTn>
-                              </p:par>
-                              <p:par>
-                                <p:cTn id="145" nodeType="withEffect" fill="hold" presetClass="entr" presetID="1">
-                                  <p:stCondLst>
-                                    <p:cond delay="0"/>
-                                  </p:stCondLst>
-                                  <p:childTnLst>
-                                    <p:set>
-                                      <p:cBhvr>
-                                        <p:cTn id="146" dur="1" fill="hold">
-                                          <p:stCondLst>
-                                            <p:cond delay="0"/>
-                                          </p:stCondLst>
-                                        </p:cTn>
-                                        <p:tgtEl>
-                                          <p:spTgt spid="108">
-                                            <p:txEl>
-                                              <p:pRg st="217" end="240"/>
-                                            </p:txEl>
-                                          </p:spTgt>
-                                        </p:tgtEl>
-                                        <p:attrNameLst>
-                                          <p:attrName>style.visibility</p:attrName>
-                                        </p:attrNameLst>
-                                      </p:cBhvr>
-                                      <p:to>
-                                        <p:strVal val="visible"/>
-                                      </p:to>
-                                    </p:set>
-                                  </p:childTnLst>
-                                </p:cTn>
-                              </p:par>
-                            </p:childTnLst>
-                          </p:cTn>
-                        </p:par>
-                      </p:childTnLst>
-                    </p:cTn>
-                  </p:par>
-                  <p:par>
-                    <p:cTn id="147" fill="freeze">
-                      <p:stCondLst>
-                        <p:cond delay="indefinite"/>
-                      </p:stCondLst>
-                      <p:childTnLst>
-                        <p:par>
-                          <p:cTn id="148" fill="freeze">
-                            <p:stCondLst>
-                              <p:cond delay="0"/>
-                            </p:stCondLst>
-                            <p:childTnLst>
-                              <p:par>
-                                <p:cTn id="149" nodeType="clickEffect" fill="hold" presetClass="entr" presetID="1">
-                                  <p:stCondLst>
-                                    <p:cond delay="0"/>
-                                  </p:stCondLst>
-                                  <p:childTnLst>
-                                    <p:set>
-                                      <p:cBhvr>
-                                        <p:cTn id="150" dur="1" fill="hold">
-                                          <p:stCondLst>
-                                            <p:cond delay="0"/>
-                                          </p:stCondLst>
-                                        </p:cTn>
-                                        <p:tgtEl>
-                                          <p:spTgt spid="108">
-                                            <p:txEl>
-                                              <p:pRg st="240" end="324"/>
-                                            </p:txEl>
-                                          </p:spTgt>
-                                        </p:tgtEl>
-                                        <p:attrNameLst>
-                                          <p:attrName>style.visibility</p:attrName>
-                                        </p:attrNameLst>
-                                      </p:cBhvr>
-                                      <p:to>
-                                        <p:strVal val="visible"/>
-                                      </p:to>
-                                    </p:set>
-                                  </p:childTnLst>
-                                </p:cTn>
-                              </p:par>
-                            </p:childTnLst>
-                          </p:cTn>
-                        </p:par>
-                      </p:childTnLst>
-                    </p:cTn>
-                  </p:par>
-                </p:childTnLst>
-              </p:cTn>
+              <p:cTn id="16" nodeType="mainSeq"/>
               <p:prevCondLst>
                 <p:cond delay="0" evt="onPrev">
                   <p:tgtEl>
@@ -10422,7 +8622,7 @@
         <p:spPr>
           <a:xfrm>
             <a:off x="504000" y="1467720"/>
-            <a:ext cx="9068400" cy="1258920"/>
+            <a:ext cx="9068040" cy="1258560"/>
           </a:xfrm>
           <a:prstGeom prst="rect">
             <a:avLst/>
@@ -10484,7 +8684,7 @@
         <p:spPr>
           <a:xfrm>
             <a:off x="504000" y="2728440"/>
-            <a:ext cx="9068400" cy="4381200"/>
+            <a:ext cx="9068040" cy="4380840"/>
           </a:xfrm>
           <a:prstGeom prst="rect">
             <a:avLst/>
@@ -10503,7 +8703,7 @@
         <p:txBody>
           <a:bodyPr lIns="0" rIns="0" tIns="0" bIns="0"/>
           <a:p>
-            <a:pPr marL="432000" indent="-320760">
+            <a:pPr marL="432000" indent="-320400">
               <a:lnSpc>
                 <a:spcPct val="100000"/>
               </a:lnSpc>
@@ -10542,7 +8742,7 @@
             </a:endParaRPr>
           </a:p>
           <a:p>
-            <a:pPr marL="432000" indent="-320760">
+            <a:pPr marL="432000" indent="-320400">
               <a:lnSpc>
                 <a:spcPct val="100000"/>
               </a:lnSpc>
@@ -10581,7 +8781,7 @@
             </a:endParaRPr>
           </a:p>
           <a:p>
-            <a:pPr marL="432000" indent="-320760">
+            <a:pPr marL="432000" indent="-320400">
               <a:lnSpc>
                 <a:spcPct val="100000"/>
               </a:lnSpc>
@@ -10620,7 +8820,7 @@
             </a:endParaRPr>
           </a:p>
           <a:p>
-            <a:pPr lvl="4" marL="1080000" indent="-214920">
+            <a:pPr lvl="4" marL="1080000" indent="-214560">
               <a:lnSpc>
                 <a:spcPct val="100000"/>
               </a:lnSpc>
@@ -10659,7 +8859,7 @@
             </a:endParaRPr>
           </a:p>
           <a:p>
-            <a:pPr lvl="4" marL="1080000" indent="-214920">
+            <a:pPr lvl="4" marL="1080000" indent="-214560">
               <a:lnSpc>
                 <a:spcPct val="100000"/>
               </a:lnSpc>
@@ -10698,7 +8898,7 @@
             </a:endParaRPr>
           </a:p>
           <a:p>
-            <a:pPr lvl="4" marL="1080000" indent="-214920">
+            <a:pPr lvl="4" marL="1080000" indent="-214560">
               <a:lnSpc>
                 <a:spcPct val="100000"/>
               </a:lnSpc>
@@ -10737,7 +8937,7 @@
             </a:endParaRPr>
           </a:p>
           <a:p>
-            <a:pPr marL="432000" indent="-320760">
+            <a:pPr marL="432000" indent="-320400">
               <a:lnSpc>
                 <a:spcPct val="100000"/>
               </a:lnSpc>
@@ -10776,7 +8976,7 @@
             </a:endParaRPr>
           </a:p>
           <a:p>
-            <a:pPr marL="432000" indent="-320760">
+            <a:pPr marL="432000" indent="-320400">
               <a:lnSpc>
                 <a:spcPct val="100000"/>
               </a:lnSpc>
@@ -10859,7 +9059,7 @@
         <p:spPr>
           <a:xfrm>
             <a:off x="0" y="0"/>
-            <a:ext cx="10076760" cy="1047240"/>
+            <a:ext cx="10076400" cy="1046880"/>
           </a:xfrm>
           <a:prstGeom prst="rect">
             <a:avLst/>
@@ -10882,7 +9082,7 @@
         <p:spPr>
           <a:xfrm>
             <a:off x="39240" y="0"/>
-            <a:ext cx="1066680" cy="1075320"/>
+            <a:ext cx="1066320" cy="1074960"/>
           </a:xfrm>
           <a:prstGeom prst="rect">
             <a:avLst/>
@@ -10901,7 +9101,7 @@
         <p:spPr>
           <a:xfrm>
             <a:off x="2448000" y="0"/>
-            <a:ext cx="7683840" cy="1061280"/>
+            <a:ext cx="7683480" cy="1060920"/>
           </a:xfrm>
           <a:prstGeom prst="rect">
             <a:avLst/>
@@ -10959,351 +9159,10 @@
   <p:timing>
     <p:tnLst>
       <p:par>
-        <p:cTn id="151" dur="indefinite" restart="never" nodeType="tmRoot">
+        <p:cTn id="17" dur="indefinite" restart="never" nodeType="tmRoot">
           <p:childTnLst>
             <p:seq>
-              <p:cTn id="152" nodeType="mainSeq">
-                <p:childTnLst>
-                  <p:par>
-                    <p:cTn id="153" fill="freeze">
-                      <p:stCondLst>
-                        <p:cond delay="indefinite"/>
-                      </p:stCondLst>
-                      <p:childTnLst>
-                        <p:par>
-                          <p:cTn id="154" fill="freeze">
-                            <p:stCondLst>
-                              <p:cond delay="0"/>
-                            </p:stCondLst>
-                            <p:childTnLst>
-                              <p:par>
-                                <p:cTn id="155" nodeType="clickEffect" fill="hold" presetClass="entr" presetID="1">
-                                  <p:stCondLst>
-                                    <p:cond delay="0"/>
-                                  </p:stCondLst>
-                                  <p:childTnLst>
-                                    <p:set>
-                                      <p:cBhvr>
-                                        <p:cTn id="156" dur="1" fill="hold">
-                                          <p:stCondLst>
-                                            <p:cond delay="0"/>
-                                          </p:stCondLst>
-                                        </p:cTn>
-                                        <p:tgtEl>
-                                          <p:spTgt spid="113">
-                                            <p:txEl>
-                                              <p:pRg st="0" end="51"/>
-                                            </p:txEl>
-                                          </p:spTgt>
-                                        </p:tgtEl>
-                                        <p:attrNameLst>
-                                          <p:attrName>style.visibility</p:attrName>
-                                        </p:attrNameLst>
-                                      </p:cBhvr>
-                                      <p:to>
-                                        <p:strVal val="visible"/>
-                                      </p:to>
-                                    </p:set>
-                                  </p:childTnLst>
-                                </p:cTn>
-                              </p:par>
-                            </p:childTnLst>
-                          </p:cTn>
-                        </p:par>
-                      </p:childTnLst>
-                    </p:cTn>
-                  </p:par>
-                  <p:par>
-                    <p:cTn id="157" fill="freeze">
-                      <p:stCondLst>
-                        <p:cond delay="indefinite"/>
-                      </p:stCondLst>
-                      <p:childTnLst>
-                        <p:par>
-                          <p:cTn id="158" fill="freeze">
-                            <p:stCondLst>
-                              <p:cond delay="0"/>
-                            </p:stCondLst>
-                            <p:childTnLst>
-                              <p:par>
-                                <p:cTn id="159" nodeType="clickEffect" fill="hold" presetClass="entr" presetID="1">
-                                  <p:stCondLst>
-                                    <p:cond delay="0"/>
-                                  </p:stCondLst>
-                                  <p:childTnLst>
-                                    <p:set>
-                                      <p:cBhvr>
-                                        <p:cTn id="160" dur="1" fill="hold">
-                                          <p:stCondLst>
-                                            <p:cond delay="0"/>
-                                          </p:stCondLst>
-                                        </p:cTn>
-                                        <p:tgtEl>
-                                          <p:spTgt spid="113">
-                                            <p:txEl>
-                                              <p:pRg st="51" end="59"/>
-                                            </p:txEl>
-                                          </p:spTgt>
-                                        </p:tgtEl>
-                                        <p:attrNameLst>
-                                          <p:attrName>style.visibility</p:attrName>
-                                        </p:attrNameLst>
-                                      </p:cBhvr>
-                                      <p:to>
-                                        <p:strVal val="visible"/>
-                                      </p:to>
-                                    </p:set>
-                                  </p:childTnLst>
-                                </p:cTn>
-                              </p:par>
-                            </p:childTnLst>
-                          </p:cTn>
-                        </p:par>
-                      </p:childTnLst>
-                    </p:cTn>
-                  </p:par>
-                  <p:par>
-                    <p:cTn id="161" fill="freeze">
-                      <p:stCondLst>
-                        <p:cond delay="indefinite"/>
-                      </p:stCondLst>
-                      <p:childTnLst>
-                        <p:par>
-                          <p:cTn id="162" fill="freeze">
-                            <p:stCondLst>
-                              <p:cond delay="0"/>
-                            </p:stCondLst>
-                            <p:childTnLst>
-                              <p:par>
-                                <p:cTn id="163" nodeType="clickEffect" fill="hold" presetClass="entr" presetID="1">
-                                  <p:stCondLst>
-                                    <p:cond delay="0"/>
-                                  </p:stCondLst>
-                                  <p:childTnLst>
-                                    <p:set>
-                                      <p:cBhvr>
-                                        <p:cTn id="164" dur="1" fill="hold">
-                                          <p:stCondLst>
-                                            <p:cond delay="0"/>
-                                          </p:stCondLst>
-                                        </p:cTn>
-                                        <p:tgtEl>
-                                          <p:spTgt spid="113">
-                                            <p:txEl>
-                                              <p:pRg st="59" end="91"/>
-                                            </p:txEl>
-                                          </p:spTgt>
-                                        </p:tgtEl>
-                                        <p:attrNameLst>
-                                          <p:attrName>style.visibility</p:attrName>
-                                        </p:attrNameLst>
-                                      </p:cBhvr>
-                                      <p:to>
-                                        <p:strVal val="visible"/>
-                                      </p:to>
-                                    </p:set>
-                                  </p:childTnLst>
-                                </p:cTn>
-                              </p:par>
-                              <p:par>
-                                <p:cTn id="165" nodeType="withEffect" fill="hold" presetClass="entr" presetID="1">
-                                  <p:stCondLst>
-                                    <p:cond delay="0"/>
-                                  </p:stCondLst>
-                                  <p:childTnLst>
-                                    <p:set>
-                                      <p:cBhvr>
-                                        <p:cTn id="166" dur="1" fill="hold">
-                                          <p:stCondLst>
-                                            <p:cond delay="0"/>
-                                          </p:stCondLst>
-                                        </p:cTn>
-                                        <p:tgtEl>
-                                          <p:spTgt spid="113">
-                                            <p:txEl>
-                                              <p:pRg st="91" end="96"/>
-                                            </p:txEl>
-                                          </p:spTgt>
-                                        </p:tgtEl>
-                                        <p:attrNameLst>
-                                          <p:attrName>style.visibility</p:attrName>
-                                        </p:attrNameLst>
-                                      </p:cBhvr>
-                                      <p:to>
-                                        <p:strVal val="visible"/>
-                                      </p:to>
-                                    </p:set>
-                                  </p:childTnLst>
-                                </p:cTn>
-                              </p:par>
-                              <p:par>
-                                <p:cTn id="167" nodeType="withEffect" fill="hold" presetClass="entr" presetID="1">
-                                  <p:stCondLst>
-                                    <p:cond delay="0"/>
-                                  </p:stCondLst>
-                                  <p:childTnLst>
-                                    <p:set>
-                                      <p:cBhvr>
-                                        <p:cTn id="168" dur="1" fill="hold">
-                                          <p:stCondLst>
-                                            <p:cond delay="0"/>
-                                          </p:stCondLst>
-                                        </p:cTn>
-                                        <p:tgtEl>
-                                          <p:spTgt spid="113">
-                                            <p:txEl>
-                                              <p:pRg st="96" end="139"/>
-                                            </p:txEl>
-                                          </p:spTgt>
-                                        </p:tgtEl>
-                                        <p:attrNameLst>
-                                          <p:attrName>style.visibility</p:attrName>
-                                        </p:attrNameLst>
-                                      </p:cBhvr>
-                                      <p:to>
-                                        <p:strVal val="visible"/>
-                                      </p:to>
-                                    </p:set>
-                                  </p:childTnLst>
-                                </p:cTn>
-                              </p:par>
-                              <p:par>
-                                <p:cTn id="169" nodeType="withEffect" fill="hold" presetClass="entr" presetID="1">
-                                  <p:stCondLst>
-                                    <p:cond delay="0"/>
-                                  </p:stCondLst>
-                                  <p:childTnLst>
-                                    <p:set>
-                                      <p:cBhvr>
-                                        <p:cTn id="170" dur="1" fill="hold">
-                                          <p:stCondLst>
-                                            <p:cond delay="0"/>
-                                          </p:stCondLst>
-                                        </p:cTn>
-                                        <p:tgtEl>
-                                          <p:spTgt spid="113">
-                                            <p:txEl>
-                                              <p:pRg st="139" end="162"/>
-                                            </p:txEl>
-                                          </p:spTgt>
-                                        </p:tgtEl>
-                                        <p:attrNameLst>
-                                          <p:attrName>style.visibility</p:attrName>
-                                        </p:attrNameLst>
-                                      </p:cBhvr>
-                                      <p:to>
-                                        <p:strVal val="visible"/>
-                                      </p:to>
-                                    </p:set>
-                                  </p:childTnLst>
-                                </p:cTn>
-                              </p:par>
-                            </p:childTnLst>
-                          </p:cTn>
-                        </p:par>
-                      </p:childTnLst>
-                    </p:cTn>
-                  </p:par>
-                  <p:par>
-                    <p:cTn id="171" fill="freeze">
-                      <p:stCondLst>
-                        <p:cond delay="indefinite"/>
-                      </p:stCondLst>
-                      <p:childTnLst>
-                        <p:par>
-                          <p:cTn id="172" fill="freeze">
-                            <p:stCondLst>
-                              <p:cond delay="0"/>
-                            </p:stCondLst>
-                            <p:childTnLst>
-                              <p:par>
-                                <p:cTn id="173" nodeType="clickEffect" fill="hold" presetClass="entr" presetID="1">
-                                  <p:stCondLst>
-                                    <p:cond delay="0"/>
-                                  </p:stCondLst>
-                                  <p:childTnLst>
-                                    <p:set>
-                                      <p:cBhvr>
-                                        <p:cTn id="174" dur="1" fill="hold">
-                                          <p:stCondLst>
-                                            <p:cond delay="0"/>
-                                          </p:stCondLst>
-                                        </p:cTn>
-                                        <p:tgtEl>
-                                          <p:spTgt spid="113">
-                                            <p:txEl>
-                                              <p:pRg st="162" end="183"/>
-                                            </p:txEl>
-                                          </p:spTgt>
-                                        </p:tgtEl>
-                                        <p:attrNameLst>
-                                          <p:attrName>style.visibility</p:attrName>
-                                        </p:attrNameLst>
-                                      </p:cBhvr>
-                                      <p:to>
-                                        <p:strVal val="visible"/>
-                                      </p:to>
-                                    </p:set>
-                                  </p:childTnLst>
-                                </p:cTn>
-                              </p:par>
-                            </p:childTnLst>
-                          </p:cTn>
-                        </p:par>
-                      </p:childTnLst>
-                    </p:cTn>
-                  </p:par>
-                  <p:par>
-                    <p:cTn id="175" fill="freeze">
-                      <p:stCondLst>
-                        <p:cond delay="indefinite"/>
-                      </p:stCondLst>
-                      <p:childTnLst>
-                        <p:par>
-                          <p:cTn id="176" fill="freeze">
-                            <p:stCondLst>
-                              <p:cond delay="0"/>
-                            </p:stCondLst>
-                            <p:childTnLst>
-                              <p:par>
-                                <p:cTn id="177" nodeType="clickEffect" fill="hold" presetClass="entr" presetID="1">
-                                  <p:stCondLst>
-                                    <p:cond delay="0"/>
-                                  </p:stCondLst>
-                                  <p:childTnLst>
-                                    <p:set>
-                                      <p:cBhvr>
-                                        <p:cTn id="178" dur="1" fill="hold">
-                                          <p:stCondLst>
-                                            <p:cond delay="0"/>
-                                          </p:stCondLst>
-                                        </p:cTn>
-                                        <p:tgtEl>
-                                          <p:spTgt spid="113">
-                                            <p:txEl>
-                                              <p:pRg st="183" end="232"/>
-                                            </p:txEl>
-                                          </p:spTgt>
-                                        </p:tgtEl>
-                                        <p:attrNameLst>
-                                          <p:attrName>style.visibility</p:attrName>
-                                        </p:attrNameLst>
-                                      </p:cBhvr>
-                                      <p:to>
-                                        <p:strVal val="visible"/>
-                                      </p:to>
-                                    </p:set>
-                                  </p:childTnLst>
-                                </p:cTn>
-                              </p:par>
-                            </p:childTnLst>
-                          </p:cTn>
-                        </p:par>
-                      </p:childTnLst>
-                    </p:cTn>
-                  </p:par>
-                </p:childTnLst>
-              </p:cTn>
+              <p:cTn id="18" nodeType="mainSeq"/>
               <p:prevCondLst>
                 <p:cond delay="0" evt="onPrev">
                   <p:tgtEl>

</xml_diff>